<commit_message>
Third time's the charm.
</commit_message>
<xml_diff>
--- a/State Partisan Control affects on Covid - BrookC Variant.pptx
+++ b/State Partisan Control affects on Covid - BrookC Variant.pptx
@@ -6,20 +6,25 @@
   </p:sldMasterIdLst>
   <p:sldIdLst>
     <p:sldId id="256" r:id="rId2"/>
-    <p:sldId id="268" r:id="rId3"/>
-    <p:sldId id="269" r:id="rId4"/>
-    <p:sldId id="262" r:id="rId5"/>
-    <p:sldId id="271" r:id="rId6"/>
-    <p:sldId id="272" r:id="rId7"/>
-    <p:sldId id="274" r:id="rId8"/>
-    <p:sldId id="275" r:id="rId9"/>
-    <p:sldId id="270" r:id="rId10"/>
-    <p:sldId id="263" r:id="rId11"/>
-    <p:sldId id="257" r:id="rId12"/>
-    <p:sldId id="267" r:id="rId13"/>
-    <p:sldId id="258" r:id="rId14"/>
-    <p:sldId id="260" r:id="rId15"/>
-    <p:sldId id="261" r:id="rId16"/>
+    <p:sldId id="281" r:id="rId3"/>
+    <p:sldId id="268" r:id="rId4"/>
+    <p:sldId id="269" r:id="rId5"/>
+    <p:sldId id="262" r:id="rId6"/>
+    <p:sldId id="271" r:id="rId7"/>
+    <p:sldId id="272" r:id="rId8"/>
+    <p:sldId id="274" r:id="rId9"/>
+    <p:sldId id="275" r:id="rId10"/>
+    <p:sldId id="270" r:id="rId11"/>
+    <p:sldId id="277" r:id="rId12"/>
+    <p:sldId id="257" r:id="rId13"/>
+    <p:sldId id="267" r:id="rId14"/>
+    <p:sldId id="258" r:id="rId15"/>
+    <p:sldId id="276" r:id="rId16"/>
+    <p:sldId id="263" r:id="rId17"/>
+    <p:sldId id="278" r:id="rId18"/>
+    <p:sldId id="280" r:id="rId19"/>
+    <p:sldId id="260" r:id="rId20"/>
+    <p:sldId id="261" r:id="rId21"/>
   </p:sldIdLst>
   <p:sldSz cx="12192000" cy="6858000"/>
   <p:notesSz cx="6858000" cy="9144000"/>
@@ -322,7 +327,7 @@
           <a:p>
             <a:fld id="{D413C6E3-C358-4D9C-8DB0-E5FF57E1DB3A}" type="datetimeFigureOut">
               <a:rPr lang="en-US" smtClean="0"/>
-              <a:t>11/13/2020</a:t>
+              <a:t>11/14/2020</a:t>
             </a:fld>
             <a:endParaRPr lang="en-US"/>
           </a:p>
@@ -603,7 +608,7 @@
           <a:p>
             <a:fld id="{D413C6E3-C358-4D9C-8DB0-E5FF57E1DB3A}" type="datetimeFigureOut">
               <a:rPr lang="en-US" smtClean="0"/>
-              <a:t>11/13/2020</a:t>
+              <a:t>11/14/2020</a:t>
             </a:fld>
             <a:endParaRPr lang="en-US"/>
           </a:p>
@@ -795,7 +800,7 @@
           <a:p>
             <a:fld id="{D413C6E3-C358-4D9C-8DB0-E5FF57E1DB3A}" type="datetimeFigureOut">
               <a:rPr lang="en-US" smtClean="0"/>
-              <a:t>11/13/2020</a:t>
+              <a:t>11/14/2020</a:t>
             </a:fld>
             <a:endParaRPr lang="en-US"/>
           </a:p>
@@ -1056,7 +1061,7 @@
           <a:p>
             <a:fld id="{D413C6E3-C358-4D9C-8DB0-E5FF57E1DB3A}" type="datetimeFigureOut">
               <a:rPr lang="en-US" smtClean="0"/>
-              <a:t>11/13/2020</a:t>
+              <a:t>11/14/2020</a:t>
             </a:fld>
             <a:endParaRPr lang="en-US"/>
           </a:p>
@@ -1482,7 +1487,7 @@
           <a:p>
             <a:fld id="{D413C6E3-C358-4D9C-8DB0-E5FF57E1DB3A}" type="datetimeFigureOut">
               <a:rPr lang="en-US" smtClean="0"/>
-              <a:t>11/13/2020</a:t>
+              <a:t>11/14/2020</a:t>
             </a:fld>
             <a:endParaRPr lang="en-US"/>
           </a:p>
@@ -2028,7 +2033,7 @@
           <a:p>
             <a:fld id="{D413C6E3-C358-4D9C-8DB0-E5FF57E1DB3A}" type="datetimeFigureOut">
               <a:rPr lang="en-US" smtClean="0"/>
-              <a:t>11/13/2020</a:t>
+              <a:t>11/14/2020</a:t>
             </a:fld>
             <a:endParaRPr lang="en-US"/>
           </a:p>
@@ -2859,7 +2864,7 @@
           <a:p>
             <a:fld id="{D413C6E3-C358-4D9C-8DB0-E5FF57E1DB3A}" type="datetimeFigureOut">
               <a:rPr lang="en-US" smtClean="0"/>
-              <a:t>11/13/2020</a:t>
+              <a:t>11/14/2020</a:t>
             </a:fld>
             <a:endParaRPr lang="en-US"/>
           </a:p>
@@ -3029,7 +3034,7 @@
           <a:p>
             <a:fld id="{D413C6E3-C358-4D9C-8DB0-E5FF57E1DB3A}" type="datetimeFigureOut">
               <a:rPr lang="en-US" smtClean="0"/>
-              <a:t>11/13/2020</a:t>
+              <a:t>11/14/2020</a:t>
             </a:fld>
             <a:endParaRPr lang="en-US"/>
           </a:p>
@@ -3209,7 +3214,7 @@
           <a:p>
             <a:fld id="{D413C6E3-C358-4D9C-8DB0-E5FF57E1DB3A}" type="datetimeFigureOut">
               <a:rPr lang="en-US" smtClean="0"/>
-              <a:t>11/13/2020</a:t>
+              <a:t>11/14/2020</a:t>
             </a:fld>
             <a:endParaRPr lang="en-US"/>
           </a:p>
@@ -3379,7 +3384,7 @@
           <a:p>
             <a:fld id="{D413C6E3-C358-4D9C-8DB0-E5FF57E1DB3A}" type="datetimeFigureOut">
               <a:rPr lang="en-US" smtClean="0"/>
-              <a:t>11/13/2020</a:t>
+              <a:t>11/14/2020</a:t>
             </a:fld>
             <a:endParaRPr lang="en-US"/>
           </a:p>
@@ -3636,7 +3641,7 @@
           <a:p>
             <a:fld id="{D413C6E3-C358-4D9C-8DB0-E5FF57E1DB3A}" type="datetimeFigureOut">
               <a:rPr lang="en-US" smtClean="0"/>
-              <a:t>11/13/2020</a:t>
+              <a:t>11/14/2020</a:t>
             </a:fld>
             <a:endParaRPr lang="en-US"/>
           </a:p>
@@ -3868,7 +3873,7 @@
           <a:p>
             <a:fld id="{D413C6E3-C358-4D9C-8DB0-E5FF57E1DB3A}" type="datetimeFigureOut">
               <a:rPr lang="en-US" smtClean="0"/>
-              <a:t>11/13/2020</a:t>
+              <a:t>11/14/2020</a:t>
             </a:fld>
             <a:endParaRPr lang="en-US"/>
           </a:p>
@@ -4261,7 +4266,7 @@
           <a:p>
             <a:fld id="{D413C6E3-C358-4D9C-8DB0-E5FF57E1DB3A}" type="datetimeFigureOut">
               <a:rPr lang="en-US" smtClean="0"/>
-              <a:t>11/13/2020</a:t>
+              <a:t>11/14/2020</a:t>
             </a:fld>
             <a:endParaRPr lang="en-US"/>
           </a:p>
@@ -4379,7 +4384,7 @@
           <a:p>
             <a:fld id="{D413C6E3-C358-4D9C-8DB0-E5FF57E1DB3A}" type="datetimeFigureOut">
               <a:rPr lang="en-US" smtClean="0"/>
-              <a:t>11/13/2020</a:t>
+              <a:t>11/14/2020</a:t>
             </a:fld>
             <a:endParaRPr lang="en-US"/>
           </a:p>
@@ -4474,7 +4479,7 @@
           <a:p>
             <a:fld id="{D413C6E3-C358-4D9C-8DB0-E5FF57E1DB3A}" type="datetimeFigureOut">
               <a:rPr lang="en-US" smtClean="0"/>
-              <a:t>11/13/2020</a:t>
+              <a:t>11/14/2020</a:t>
             </a:fld>
             <a:endParaRPr lang="en-US"/>
           </a:p>
@@ -4747,7 +4752,7 @@
           <a:p>
             <a:fld id="{D413C6E3-C358-4D9C-8DB0-E5FF57E1DB3A}" type="datetimeFigureOut">
               <a:rPr lang="en-US" smtClean="0"/>
-              <a:t>11/13/2020</a:t>
+              <a:t>11/14/2020</a:t>
             </a:fld>
             <a:endParaRPr lang="en-US"/>
           </a:p>
@@ -5028,7 +5033,7 @@
           <a:p>
             <a:fld id="{D413C6E3-C358-4D9C-8DB0-E5FF57E1DB3A}" type="datetimeFigureOut">
               <a:rPr lang="en-US" smtClean="0"/>
-              <a:t>11/13/2020</a:t>
+              <a:t>11/14/2020</a:t>
             </a:fld>
             <a:endParaRPr lang="en-US"/>
           </a:p>
@@ -5268,7 +5273,7 @@
           <a:p>
             <a:fld id="{D413C6E3-C358-4D9C-8DB0-E5FF57E1DB3A}" type="datetimeFigureOut">
               <a:rPr lang="en-US" smtClean="0"/>
-              <a:t>11/13/2020</a:t>
+              <a:t>11/14/2020</a:t>
             </a:fld>
             <a:endParaRPr lang="en-US"/>
           </a:p>
@@ -5955,6 +5960,278 @@
           <p:cNvPr id="2" name="Title 1">
             <a:extLst>
               <a:ext uri="{FF2B5EF4-FFF2-40B4-BE49-F238E27FC236}">
+                <a16:creationId xmlns:a16="http://schemas.microsoft.com/office/drawing/2014/main" id="{E02AABAF-448B-4D6A-98F0-31C63D31B459}"/>
+              </a:ext>
+            </a:extLst>
+          </p:cNvPr>
+          <p:cNvSpPr>
+            <a:spLocks noGrp="1"/>
+          </p:cNvSpPr>
+          <p:nvPr>
+            <p:ph type="title"/>
+          </p:nvPr>
+        </p:nvSpPr>
+        <p:spPr/>
+        <p:txBody>
+          <a:bodyPr>
+            <a:noAutofit/>
+          </a:bodyPr>
+          <a:lstStyle/>
+          <a:p>
+            <a:r>
+              <a:rPr lang="en-US" sz="4000" dirty="0"/>
+              <a:t>Does a state’s partisan control impact short term unemployment during Covid-19?</a:t>
+            </a:r>
+          </a:p>
+        </p:txBody>
+      </p:sp>
+      <p:sp>
+        <p:nvSpPr>
+          <p:cNvPr id="3" name="Content Placeholder 2">
+            <a:extLst>
+              <a:ext uri="{FF2B5EF4-FFF2-40B4-BE49-F238E27FC236}">
+                <a16:creationId xmlns:a16="http://schemas.microsoft.com/office/drawing/2014/main" id="{437BBAFF-9B54-4D7F-B78F-9F740D21542D}"/>
+              </a:ext>
+            </a:extLst>
+          </p:cNvPr>
+          <p:cNvSpPr>
+            <a:spLocks noGrp="1"/>
+          </p:cNvSpPr>
+          <p:nvPr>
+            <p:ph idx="1"/>
+          </p:nvPr>
+        </p:nvSpPr>
+        <p:spPr>
+          <a:xfrm>
+            <a:off x="838200" y="1825625"/>
+            <a:ext cx="5829300" cy="4351338"/>
+          </a:xfrm>
+        </p:spPr>
+        <p:txBody>
+          <a:bodyPr>
+            <a:normAutofit fontScale="47500" lnSpcReduction="20000"/>
+          </a:bodyPr>
+          <a:lstStyle/>
+          <a:p>
+            <a:r>
+              <a:rPr lang="en-US" sz="3400" dirty="0"/>
+              <a:t>3 variables:</a:t>
+            </a:r>
+          </a:p>
+          <a:p>
+            <a:pPr marL="914400" lvl="1" indent="-457200">
+              <a:buFont typeface="+mj-lt"/>
+              <a:buAutoNum type="arabicPeriod"/>
+            </a:pPr>
+            <a:r>
+              <a:rPr lang="en-US" sz="2900" dirty="0"/>
+              <a:t>Partisan control at state level</a:t>
+            </a:r>
+          </a:p>
+          <a:p>
+            <a:pPr marL="914400" lvl="1" indent="-457200">
+              <a:buFont typeface="+mj-lt"/>
+              <a:buAutoNum type="arabicPeriod"/>
+            </a:pPr>
+            <a:r>
+              <a:rPr lang="en-US" sz="2900" dirty="0"/>
+              <a:t>Number of Covid-19 cases</a:t>
+            </a:r>
+          </a:p>
+          <a:p>
+            <a:pPr lvl="2"/>
+            <a:r>
+              <a:rPr lang="en-US" sz="2500" dirty="0"/>
+              <a:t>New cases per 100,000 (avg per state)</a:t>
+            </a:r>
+          </a:p>
+          <a:p>
+            <a:pPr marL="914400" lvl="1" indent="-457200">
+              <a:buFont typeface="+mj-lt"/>
+              <a:buAutoNum type="arabicPeriod"/>
+            </a:pPr>
+            <a:r>
+              <a:rPr lang="en-US" sz="2900" dirty="0"/>
+              <a:t>Unemployment rate </a:t>
+            </a:r>
+          </a:p>
+          <a:p>
+            <a:pPr lvl="2"/>
+            <a:r>
+              <a:rPr lang="en-US" sz="2500" dirty="0">
+                <a:solidFill>
+                  <a:srgbClr val="FFC000"/>
+                </a:solidFill>
+              </a:rPr>
+              <a:t>Insured Unemployment Rate (avg rate per state)</a:t>
+            </a:r>
+          </a:p>
+          <a:p>
+            <a:pPr lvl="3"/>
+            <a:r>
+              <a:rPr lang="en-US" sz="2500" dirty="0">
+                <a:solidFill>
+                  <a:srgbClr val="FFC000"/>
+                </a:solidFill>
+              </a:rPr>
+              <a:t>“The number of people currently receiving unemployment insurance (UI) as a percentage of the labor force.” - stlouisfed.org</a:t>
+            </a:r>
+            <a:endParaRPr lang="en-US" dirty="0">
+              <a:solidFill>
+                <a:srgbClr val="FFC000"/>
+              </a:solidFill>
+            </a:endParaRPr>
+          </a:p>
+          <a:p>
+            <a:pPr marL="914400" lvl="2" indent="0">
+              <a:buNone/>
+            </a:pPr>
+            <a:endParaRPr lang="en-US" dirty="0"/>
+          </a:p>
+          <a:p>
+            <a:pPr marL="0" indent="0">
+              <a:buNone/>
+            </a:pPr>
+            <a:r>
+              <a:rPr lang="en-US" sz="4000" dirty="0"/>
+              <a:t>Is the partisanship of a state correlated to the state’s unemployment rate?</a:t>
+            </a:r>
+          </a:p>
+          <a:p>
+            <a:endParaRPr lang="en-US" sz="4000" dirty="0"/>
+          </a:p>
+          <a:p>
+            <a:pPr marL="0" indent="0">
+              <a:buNone/>
+            </a:pPr>
+            <a:r>
+              <a:rPr lang="en-US" sz="4000" dirty="0"/>
+              <a:t>Can we correlate the number of covid-19 cases to the unemployment rate?</a:t>
+            </a:r>
+          </a:p>
+          <a:p>
+            <a:endParaRPr lang="en-US" dirty="0"/>
+          </a:p>
+          <a:p>
+            <a:r>
+              <a:rPr lang="en-US" dirty="0"/>
+              <a:t>Sources: </a:t>
+            </a:r>
+          </a:p>
+          <a:p>
+            <a:pPr lvl="1">
+              <a:buFont typeface="Courier New" panose="02070309020205020404" pitchFamily="49" charset="0"/>
+              <a:buChar char="o"/>
+            </a:pPr>
+            <a:r>
+              <a:rPr lang="en-US" dirty="0"/>
+              <a:t>Unemployment claims by state.csv - </a:t>
+            </a:r>
+            <a:r>
+              <a:rPr lang="en-US" dirty="0">
+                <a:hlinkClick r:id="rId2"/>
+              </a:rPr>
+              <a:t>https://oui.doleta.gov/unemploy/claims.asp</a:t>
+            </a:r>
+            <a:endParaRPr lang="en-US" dirty="0"/>
+          </a:p>
+          <a:p>
+            <a:pPr lvl="1">
+              <a:buFont typeface="Courier New" panose="02070309020205020404" pitchFamily="49" charset="0"/>
+              <a:buChar char="o"/>
+            </a:pPr>
+            <a:r>
+              <a:rPr lang="en-US" dirty="0" err="1"/>
+              <a:t>Covid</a:t>
+            </a:r>
+            <a:r>
+              <a:rPr lang="en-US" dirty="0"/>
+              <a:t> cases by state.csv - </a:t>
+            </a:r>
+            <a:r>
+              <a:rPr lang="en-US" dirty="0">
+                <a:hlinkClick r:id="rId3"/>
+              </a:rPr>
+              <a:t>https://catalog.data.gov/dataset/united-states-covid-19-cases-and-deaths-by-state-over-time</a:t>
+            </a:r>
+            <a:r>
+              <a:rPr lang="en-US" dirty="0"/>
+              <a:t> </a:t>
+            </a:r>
+          </a:p>
+        </p:txBody>
+      </p:sp>
+      <p:pic>
+        <p:nvPicPr>
+          <p:cNvPr id="6" name="Picture 5">
+            <a:extLst>
+              <a:ext uri="{FF2B5EF4-FFF2-40B4-BE49-F238E27FC236}">
+                <a16:creationId xmlns:a16="http://schemas.microsoft.com/office/drawing/2014/main" id="{226C4FF3-B0BA-4AC7-A700-683E3977133C}"/>
+              </a:ext>
+            </a:extLst>
+          </p:cNvPr>
+          <p:cNvPicPr>
+            <a:picLocks noChangeAspect="1"/>
+          </p:cNvPicPr>
+          <p:nvPr/>
+        </p:nvPicPr>
+        <p:blipFill>
+          <a:blip r:embed="rId4">
+            <a:extLst>
+              <a:ext uri="{28A0092B-C50C-407E-A947-70E740481C1C}">
+                <a14:useLocalDpi xmlns:a14="http://schemas.microsoft.com/office/drawing/2010/main" val="0"/>
+              </a:ext>
+            </a:extLst>
+          </a:blip>
+          <a:stretch>
+            <a:fillRect/>
+          </a:stretch>
+        </p:blipFill>
+        <p:spPr>
+          <a:xfrm>
+            <a:off x="6812280" y="2105406"/>
+            <a:ext cx="4864696" cy="3312414"/>
+          </a:xfrm>
+          <a:prstGeom prst="rect">
+            <a:avLst/>
+          </a:prstGeom>
+        </p:spPr>
+      </p:pic>
+    </p:spTree>
+    <p:extLst>
+      <p:ext uri="{BB962C8B-B14F-4D97-AF65-F5344CB8AC3E}">
+        <p14:creationId xmlns:p14="http://schemas.microsoft.com/office/powerpoint/2010/main" val="2853199800"/>
+      </p:ext>
+    </p:extLst>
+  </p:cSld>
+  <p:clrMapOvr>
+    <a:masterClrMapping/>
+  </p:clrMapOvr>
+</p:sld>
+</file>
+
+<file path=ppt/slides/slide11.xml><?xml version="1.0" encoding="utf-8"?>
+<p:sld xmlns:a="http://schemas.openxmlformats.org/drawingml/2006/main" xmlns:r="http://schemas.openxmlformats.org/officeDocument/2006/relationships" xmlns:p="http://schemas.openxmlformats.org/presentationml/2006/main">
+  <p:cSld>
+    <p:spTree>
+      <p:nvGrpSpPr>
+        <p:cNvPr id="1" name=""/>
+        <p:cNvGrpSpPr/>
+        <p:nvPr/>
+      </p:nvGrpSpPr>
+      <p:grpSpPr>
+        <a:xfrm>
+          <a:off x="0" y="0"/>
+          <a:ext cx="0" cy="0"/>
+          <a:chOff x="0" y="0"/>
+          <a:chExt cx="0" cy="0"/>
+        </a:xfrm>
+      </p:grpSpPr>
+      <p:sp>
+        <p:nvSpPr>
+          <p:cNvPr id="2" name="Title 1">
+            <a:extLst>
+              <a:ext uri="{FF2B5EF4-FFF2-40B4-BE49-F238E27FC236}">
                 <a16:creationId xmlns:a16="http://schemas.microsoft.com/office/drawing/2014/main" id="{95B1B748-003F-4B09-9FDA-018945600FF1}"/>
               </a:ext>
             </a:extLst>
@@ -6207,7 +6484,7 @@
     </p:spTree>
     <p:extLst>
       <p:ext uri="{BB962C8B-B14F-4D97-AF65-F5344CB8AC3E}">
-        <p14:creationId xmlns:p14="http://schemas.microsoft.com/office/powerpoint/2010/main" val="807571354"/>
+        <p14:creationId xmlns:p14="http://schemas.microsoft.com/office/powerpoint/2010/main" val="2950628998"/>
       </p:ext>
     </p:extLst>
   </p:cSld>
@@ -6217,7 +6494,7 @@
 </p:sld>
 </file>
 
-<file path=ppt/slides/slide11.xml><?xml version="1.0" encoding="utf-8"?>
+<file path=ppt/slides/slide12.xml><?xml version="1.0" encoding="utf-8"?>
 <p:sld xmlns:a="http://schemas.openxmlformats.org/drawingml/2006/main" xmlns:r="http://schemas.openxmlformats.org/officeDocument/2006/relationships" xmlns:p="http://schemas.openxmlformats.org/presentationml/2006/main">
   <p:cSld>
     <p:spTree>
@@ -6497,7 +6774,7 @@
 </p:sld>
 </file>
 
-<file path=ppt/slides/slide12.xml><?xml version="1.0" encoding="utf-8"?>
+<file path=ppt/slides/slide13.xml><?xml version="1.0" encoding="utf-8"?>
 <p:sld xmlns:a="http://schemas.openxmlformats.org/drawingml/2006/main" xmlns:r="http://schemas.openxmlformats.org/officeDocument/2006/relationships" xmlns:p="http://schemas.openxmlformats.org/presentationml/2006/main">
   <p:cSld>
     <p:spTree>
@@ -6665,7 +6942,7 @@
 </p:sld>
 </file>
 
-<file path=ppt/slides/slide13.xml><?xml version="1.0" encoding="utf-8"?>
+<file path=ppt/slides/slide14.xml><?xml version="1.0" encoding="utf-8"?>
 <p:sld xmlns:a="http://schemas.openxmlformats.org/drawingml/2006/main" xmlns:r="http://schemas.openxmlformats.org/officeDocument/2006/relationships" xmlns:p="http://schemas.openxmlformats.org/presentationml/2006/main">
   <p:cSld>
     <p:spTree>
@@ -6889,94 +7166,6 @@
 </p:sld>
 </file>
 
-<file path=ppt/slides/slide14.xml><?xml version="1.0" encoding="utf-8"?>
-<p:sld xmlns:a="http://schemas.openxmlformats.org/drawingml/2006/main" xmlns:r="http://schemas.openxmlformats.org/officeDocument/2006/relationships" xmlns:p="http://schemas.openxmlformats.org/presentationml/2006/main">
-  <p:cSld>
-    <p:spTree>
-      <p:nvGrpSpPr>
-        <p:cNvPr id="1" name=""/>
-        <p:cNvGrpSpPr/>
-        <p:nvPr/>
-      </p:nvGrpSpPr>
-      <p:grpSpPr>
-        <a:xfrm>
-          <a:off x="0" y="0"/>
-          <a:ext cx="0" cy="0"/>
-          <a:chOff x="0" y="0"/>
-          <a:chExt cx="0" cy="0"/>
-        </a:xfrm>
-      </p:grpSpPr>
-      <p:sp>
-        <p:nvSpPr>
-          <p:cNvPr id="2" name="Title 1">
-            <a:extLst>
-              <a:ext uri="{FF2B5EF4-FFF2-40B4-BE49-F238E27FC236}">
-                <a16:creationId xmlns:a16="http://schemas.microsoft.com/office/drawing/2014/main" id="{645FD969-10FF-45CB-BF9B-58EAD1275A38}"/>
-              </a:ext>
-            </a:extLst>
-          </p:cNvPr>
-          <p:cNvSpPr>
-            <a:spLocks noGrp="1"/>
-          </p:cNvSpPr>
-          <p:nvPr>
-            <p:ph type="title"/>
-          </p:nvPr>
-        </p:nvSpPr>
-        <p:spPr/>
-        <p:txBody>
-          <a:bodyPr/>
-          <a:lstStyle/>
-          <a:p>
-            <a:r>
-              <a:rPr lang="en-US" dirty="0"/>
-              <a:t>Conclusions and </a:t>
-            </a:r>
-            <a:r>
-              <a:rPr lang="en-US" dirty="0" err="1"/>
-              <a:t>Imact</a:t>
-            </a:r>
-            <a:endParaRPr lang="en-US" dirty="0"/>
-          </a:p>
-        </p:txBody>
-      </p:sp>
-      <p:sp>
-        <p:nvSpPr>
-          <p:cNvPr id="3" name="Content Placeholder 2">
-            <a:extLst>
-              <a:ext uri="{FF2B5EF4-FFF2-40B4-BE49-F238E27FC236}">
-                <a16:creationId xmlns:a16="http://schemas.microsoft.com/office/drawing/2014/main" id="{18E59BD6-9A93-46AF-A3F5-FA4BAF25454E}"/>
-              </a:ext>
-            </a:extLst>
-          </p:cNvPr>
-          <p:cNvSpPr>
-            <a:spLocks noGrp="1"/>
-          </p:cNvSpPr>
-          <p:nvPr>
-            <p:ph idx="1"/>
-          </p:nvPr>
-        </p:nvSpPr>
-        <p:spPr/>
-        <p:txBody>
-          <a:bodyPr/>
-          <a:lstStyle/>
-          <a:p>
-            <a:endParaRPr lang="en-US"/>
-          </a:p>
-        </p:txBody>
-      </p:sp>
-    </p:spTree>
-    <p:extLst>
-      <p:ext uri="{BB962C8B-B14F-4D97-AF65-F5344CB8AC3E}">
-        <p14:creationId xmlns:p14="http://schemas.microsoft.com/office/powerpoint/2010/main" val="1914500263"/>
-      </p:ext>
-    </p:extLst>
-  </p:cSld>
-  <p:clrMapOvr>
-    <a:masterClrMapping/>
-  </p:clrMapOvr>
-</p:sld>
-</file>
-
 <file path=ppt/slides/slide15.xml><?xml version="1.0" encoding="utf-8"?>
 <p:sld xmlns:a="http://schemas.openxmlformats.org/drawingml/2006/main" xmlns:r="http://schemas.openxmlformats.org/officeDocument/2006/relationships" xmlns:p="http://schemas.openxmlformats.org/presentationml/2006/main">
   <p:cSld>
@@ -6999,7 +7188,7 @@
           <p:cNvPr id="2" name="Title 1">
             <a:extLst>
               <a:ext uri="{FF2B5EF4-FFF2-40B4-BE49-F238E27FC236}">
-                <a16:creationId xmlns:a16="http://schemas.microsoft.com/office/drawing/2014/main" id="{87B3CCE1-2026-41E0-9A18-F20B1743FFAE}"/>
+                <a16:creationId xmlns:a16="http://schemas.microsoft.com/office/drawing/2014/main" id="{E02AABAF-448B-4D6A-98F0-31C63D31B459}"/>
               </a:ext>
             </a:extLst>
           </p:cNvPr>
@@ -7013,13 +7202,20 @@
         <p:spPr/>
         <p:txBody>
           <a:bodyPr>
-            <a:normAutofit fontScale="90000"/>
+            <a:noAutofit/>
           </a:bodyPr>
           <a:lstStyle/>
           <a:p>
             <a:r>
-              <a:rPr lang="en-US" dirty="0"/>
-              <a:t>Difficulties and Further Considerations</a:t>
+              <a:rPr lang="en-US" sz="2400" dirty="0"/>
+              <a:t>Henry Slide</a:t>
+            </a:r>
+            <a:br>
+              <a:rPr lang="en-US" sz="4000" dirty="0"/>
+            </a:br>
+            <a:r>
+              <a:rPr lang="en-US" sz="4000" dirty="0"/>
+              <a:t>Does a state’s partisan control impact bankruptcy filings during Covid-19?</a:t>
             </a:r>
           </a:p>
         </p:txBody>
@@ -7029,7 +7225,7 @@
           <p:cNvPr id="3" name="Content Placeholder 2">
             <a:extLst>
               <a:ext uri="{FF2B5EF4-FFF2-40B4-BE49-F238E27FC236}">
-                <a16:creationId xmlns:a16="http://schemas.microsoft.com/office/drawing/2014/main" id="{80314EA5-36F3-4A47-9B03-552F627F799A}"/>
+                <a16:creationId xmlns:a16="http://schemas.microsoft.com/office/drawing/2014/main" id="{437BBAFF-9B54-4D7F-B78F-9F740D21542D}"/>
               </a:ext>
             </a:extLst>
           </p:cNvPr>
@@ -7040,19 +7236,1107 @@
             <p:ph idx="1"/>
           </p:nvPr>
         </p:nvSpPr>
-        <p:spPr/>
-        <p:txBody>
-          <a:bodyPr/>
-          <a:lstStyle/>
-          <a:p>
-            <a:endParaRPr lang="en-US"/>
-          </a:p>
-        </p:txBody>
-      </p:sp>
+        <p:spPr>
+          <a:xfrm>
+            <a:off x="838200" y="1825625"/>
+            <a:ext cx="5829300" cy="4351338"/>
+          </a:xfrm>
+        </p:spPr>
+        <p:txBody>
+          <a:bodyPr>
+            <a:normAutofit fontScale="55000" lnSpcReduction="20000"/>
+          </a:bodyPr>
+          <a:lstStyle/>
+          <a:p>
+            <a:r>
+              <a:rPr lang="en-US" sz="3400" dirty="0"/>
+              <a:t>3 variables:</a:t>
+            </a:r>
+          </a:p>
+          <a:p>
+            <a:pPr marL="914400" lvl="1" indent="-457200">
+              <a:buFont typeface="+mj-lt"/>
+              <a:buAutoNum type="arabicPeriod"/>
+            </a:pPr>
+            <a:r>
+              <a:rPr lang="en-US" sz="2900" dirty="0"/>
+              <a:t>Partisan control at state level</a:t>
+            </a:r>
+          </a:p>
+          <a:p>
+            <a:pPr marL="914400" lvl="1" indent="-457200">
+              <a:buFont typeface="+mj-lt"/>
+              <a:buAutoNum type="arabicPeriod"/>
+            </a:pPr>
+            <a:r>
+              <a:rPr lang="en-US" sz="2900" dirty="0"/>
+              <a:t>Observing period before and after pandemic begins</a:t>
+            </a:r>
+            <a:endParaRPr lang="en-US" sz="2500" dirty="0"/>
+          </a:p>
+          <a:p>
+            <a:pPr marL="914400" lvl="1" indent="-457200">
+              <a:buFont typeface="+mj-lt"/>
+              <a:buAutoNum type="arabicPeriod"/>
+            </a:pPr>
+            <a:r>
+              <a:rPr lang="en-US" sz="2900" dirty="0"/>
+              <a:t>Combined Chapter 13 and 7  bankruptcies</a:t>
+            </a:r>
+          </a:p>
+          <a:p>
+            <a:pPr lvl="2"/>
+            <a:r>
+              <a:rPr lang="en-US" sz="2500" dirty="0">
+                <a:solidFill>
+                  <a:srgbClr val="FFC000"/>
+                </a:solidFill>
+              </a:rPr>
+              <a:t>First analysis by total bankruptcies</a:t>
+            </a:r>
+          </a:p>
+          <a:p>
+            <a:pPr lvl="2"/>
+            <a:r>
+              <a:rPr lang="en-US" sz="2500" dirty="0">
+                <a:solidFill>
+                  <a:srgbClr val="FFC000"/>
+                </a:solidFill>
+              </a:rPr>
+              <a:t>Second analysis by average bankruptcy rates per 100,000</a:t>
+            </a:r>
+          </a:p>
+          <a:p>
+            <a:pPr marL="914400" lvl="2" indent="0">
+              <a:buNone/>
+            </a:pPr>
+            <a:endParaRPr lang="en-US" dirty="0"/>
+          </a:p>
+          <a:p>
+            <a:pPr marL="0" indent="0">
+              <a:buNone/>
+            </a:pPr>
+            <a:r>
+              <a:rPr lang="en-US" sz="4000" dirty="0"/>
+              <a:t>Have Republican controlled states faired better or worse through the pandemic?</a:t>
+            </a:r>
+          </a:p>
+          <a:p>
+            <a:endParaRPr lang="en-US" sz="4000" dirty="0"/>
+          </a:p>
+          <a:p>
+            <a:pPr marL="0" indent="0">
+              <a:buNone/>
+            </a:pPr>
+            <a:r>
+              <a:rPr lang="en-US" sz="4000" dirty="0"/>
+              <a:t>And if so, can we infer why?</a:t>
+            </a:r>
+          </a:p>
+          <a:p>
+            <a:endParaRPr lang="en-US" dirty="0"/>
+          </a:p>
+          <a:p>
+            <a:r>
+              <a:rPr lang="en-US" dirty="0"/>
+              <a:t>Sources: </a:t>
+            </a:r>
+          </a:p>
+          <a:p>
+            <a:pPr lvl="1">
+              <a:buFont typeface="Courier New" panose="02070309020205020404" pitchFamily="49" charset="0"/>
+              <a:buChar char="o"/>
+            </a:pPr>
+            <a:r>
+              <a:rPr lang="en-US" dirty="0"/>
+              <a:t>13 and 7 bankruptcy filings by state.csv - </a:t>
+            </a:r>
+            <a:r>
+              <a:rPr lang="en-US" dirty="0">
+                <a:hlinkClick r:id="rId2"/>
+              </a:rPr>
+              <a:t>https://www.abi.org/newsroom/bankruptcy-statistics</a:t>
+            </a:r>
+            <a:endParaRPr lang="en-US" dirty="0"/>
+          </a:p>
+          <a:p>
+            <a:pPr lvl="1">
+              <a:buFont typeface="Courier New" panose="02070309020205020404" pitchFamily="49" charset="0"/>
+              <a:buChar char="o"/>
+            </a:pPr>
+            <a:r>
+              <a:rPr lang="en-US" dirty="0"/>
+              <a:t>Partisan control.pdf - </a:t>
+            </a:r>
+            <a:r>
+              <a:rPr lang="en-US" dirty="0">
+                <a:hlinkClick r:id="rId3"/>
+              </a:rPr>
+              <a:t>https://www.ncsl.org/Portals/1/Documents/Elections/Legis_Control_2020_April%201.pdf</a:t>
+            </a:r>
+            <a:endParaRPr lang="en-US" dirty="0"/>
+          </a:p>
+          <a:p>
+            <a:pPr lvl="1">
+              <a:buFont typeface="Courier New" panose="02070309020205020404" pitchFamily="49" charset="0"/>
+              <a:buChar char="o"/>
+            </a:pPr>
+            <a:endParaRPr lang="en-US" dirty="0"/>
+          </a:p>
+        </p:txBody>
+      </p:sp>
+      <p:pic>
+        <p:nvPicPr>
+          <p:cNvPr id="6" name="Picture 5">
+            <a:extLst>
+              <a:ext uri="{FF2B5EF4-FFF2-40B4-BE49-F238E27FC236}">
+                <a16:creationId xmlns:a16="http://schemas.microsoft.com/office/drawing/2014/main" id="{226C4FF3-B0BA-4AC7-A700-683E3977133C}"/>
+              </a:ext>
+            </a:extLst>
+          </p:cNvPr>
+          <p:cNvPicPr>
+            <a:picLocks noChangeAspect="1"/>
+          </p:cNvPicPr>
+          <p:nvPr/>
+        </p:nvPicPr>
+        <p:blipFill>
+          <a:blip r:embed="rId4">
+            <a:extLst>
+              <a:ext uri="{28A0092B-C50C-407E-A947-70E740481C1C}">
+                <a14:useLocalDpi xmlns:a14="http://schemas.microsoft.com/office/drawing/2010/main" val="0"/>
+              </a:ext>
+            </a:extLst>
+          </a:blip>
+          <a:stretch>
+            <a:fillRect/>
+          </a:stretch>
+        </p:blipFill>
+        <p:spPr>
+          <a:xfrm>
+            <a:off x="6812280" y="2105406"/>
+            <a:ext cx="4864696" cy="3312414"/>
+          </a:xfrm>
+          <a:prstGeom prst="rect">
+            <a:avLst/>
+          </a:prstGeom>
+        </p:spPr>
+      </p:pic>
     </p:spTree>
     <p:extLst>
       <p:ext uri="{BB962C8B-B14F-4D97-AF65-F5344CB8AC3E}">
-        <p14:creationId xmlns:p14="http://schemas.microsoft.com/office/powerpoint/2010/main" val="1332136975"/>
+        <p14:creationId xmlns:p14="http://schemas.microsoft.com/office/powerpoint/2010/main" val="445770687"/>
+      </p:ext>
+    </p:extLst>
+  </p:cSld>
+  <p:clrMapOvr>
+    <a:masterClrMapping/>
+  </p:clrMapOvr>
+</p:sld>
+</file>
+
+<file path=ppt/slides/slide16.xml><?xml version="1.0" encoding="utf-8"?>
+<p:sld xmlns:a="http://schemas.openxmlformats.org/drawingml/2006/main" xmlns:r="http://schemas.openxmlformats.org/officeDocument/2006/relationships" xmlns:p="http://schemas.openxmlformats.org/presentationml/2006/main">
+  <p:cSld>
+    <p:spTree>
+      <p:nvGrpSpPr>
+        <p:cNvPr id="1" name=""/>
+        <p:cNvGrpSpPr/>
+        <p:nvPr/>
+      </p:nvGrpSpPr>
+      <p:grpSpPr>
+        <a:xfrm>
+          <a:off x="0" y="0"/>
+          <a:ext cx="0" cy="0"/>
+          <a:chOff x="0" y="0"/>
+          <a:chExt cx="0" cy="0"/>
+        </a:xfrm>
+      </p:grpSpPr>
+      <p:sp>
+        <p:nvSpPr>
+          <p:cNvPr id="2" name="Title 1">
+            <a:extLst>
+              <a:ext uri="{FF2B5EF4-FFF2-40B4-BE49-F238E27FC236}">
+                <a16:creationId xmlns:a16="http://schemas.microsoft.com/office/drawing/2014/main" id="{95B1B748-003F-4B09-9FDA-018945600FF1}"/>
+              </a:ext>
+            </a:extLst>
+          </p:cNvPr>
+          <p:cNvSpPr>
+            <a:spLocks noGrp="1"/>
+          </p:cNvSpPr>
+          <p:nvPr>
+            <p:ph type="title"/>
+          </p:nvPr>
+        </p:nvSpPr>
+        <p:spPr/>
+        <p:txBody>
+          <a:bodyPr>
+            <a:normAutofit/>
+          </a:bodyPr>
+          <a:lstStyle/>
+          <a:p>
+            <a:r>
+              <a:rPr lang="en-US" sz="2700" dirty="0"/>
+              <a:t>Henry Slide</a:t>
+            </a:r>
+            <a:br>
+              <a:rPr lang="en-US" dirty="0"/>
+            </a:br>
+            <a:r>
+              <a:rPr lang="en-US" dirty="0"/>
+              <a:t>Data Cleanup &amp; Exploration</a:t>
+            </a:r>
+          </a:p>
+        </p:txBody>
+      </p:sp>
+      <p:sp>
+        <p:nvSpPr>
+          <p:cNvPr id="8" name="TextBox 7">
+            <a:extLst>
+              <a:ext uri="{FF2B5EF4-FFF2-40B4-BE49-F238E27FC236}">
+                <a16:creationId xmlns:a16="http://schemas.microsoft.com/office/drawing/2014/main" id="{FEE31DE6-E00C-4F20-BE0D-20B02A207B89}"/>
+              </a:ext>
+            </a:extLst>
+          </p:cNvPr>
+          <p:cNvSpPr txBox="1"/>
+          <p:nvPr/>
+        </p:nvSpPr>
+        <p:spPr>
+          <a:xfrm>
+            <a:off x="373701" y="1539360"/>
+            <a:ext cx="4892363" cy="2308324"/>
+          </a:xfrm>
+          <a:prstGeom prst="rect">
+            <a:avLst/>
+          </a:prstGeom>
+          <a:noFill/>
+        </p:spPr>
+        <p:txBody>
+          <a:bodyPr wrap="square" rtlCol="0">
+            <a:spAutoFit/>
+          </a:bodyPr>
+          <a:lstStyle/>
+          <a:p>
+            <a:r>
+              <a:rPr lang="en-US" dirty="0"/>
+              <a:t>Compile data:</a:t>
+            </a:r>
+          </a:p>
+          <a:p>
+            <a:pPr marL="800100" lvl="1" indent="-342900">
+              <a:buFont typeface="+mj-lt"/>
+              <a:buAutoNum type="arabicPeriod"/>
+            </a:pPr>
+            <a:r>
+              <a:rPr lang="en-US" dirty="0"/>
+              <a:t>For loop import and read 20+ Excel files</a:t>
+            </a:r>
+          </a:p>
+          <a:p>
+            <a:pPr marL="800100" lvl="1" indent="-342900">
+              <a:buFont typeface="+mj-lt"/>
+              <a:buAutoNum type="arabicPeriod"/>
+            </a:pPr>
+            <a:r>
+              <a:rPr lang="en-US" dirty="0"/>
+              <a:t>Extract and paste monthly </a:t>
+            </a:r>
+            <a:r>
+              <a:rPr lang="en-US" dirty="0" err="1"/>
+              <a:t>commulative</a:t>
+            </a:r>
+            <a:r>
+              <a:rPr lang="en-US" dirty="0"/>
+              <a:t> data into an empty </a:t>
+            </a:r>
+            <a:r>
+              <a:rPr lang="en-US" dirty="0" err="1"/>
+              <a:t>dataframe</a:t>
+            </a:r>
+            <a:endParaRPr lang="en-US" dirty="0"/>
+          </a:p>
+          <a:p>
+            <a:pPr marL="800100" lvl="1" indent="-342900">
+              <a:buFont typeface="+mj-lt"/>
+              <a:buAutoNum type="arabicPeriod"/>
+            </a:pPr>
+            <a:r>
+              <a:rPr lang="en-US" dirty="0"/>
+              <a:t>Convert cumulative data using .diff() and .replace() null and negatives with correct</a:t>
+            </a:r>
+          </a:p>
+          <a:p>
+            <a:pPr marL="800100" lvl="1" indent="-342900">
+              <a:buFont typeface="+mj-lt"/>
+              <a:buAutoNum type="arabicPeriod"/>
+            </a:pPr>
+            <a:r>
+              <a:rPr lang="en-US" dirty="0"/>
+              <a:t>Merge bankruptcy, state control, and census datasets</a:t>
+            </a:r>
+          </a:p>
+        </p:txBody>
+      </p:sp>
+      <p:sp>
+        <p:nvSpPr>
+          <p:cNvPr id="10" name="TextBox 9">
+            <a:extLst>
+              <a:ext uri="{FF2B5EF4-FFF2-40B4-BE49-F238E27FC236}">
+                <a16:creationId xmlns:a16="http://schemas.microsoft.com/office/drawing/2014/main" id="{3359D3F8-8907-445D-97DF-61808E7A46AE}"/>
+              </a:ext>
+            </a:extLst>
+          </p:cNvPr>
+          <p:cNvSpPr txBox="1"/>
+          <p:nvPr/>
+        </p:nvSpPr>
+        <p:spPr>
+          <a:xfrm>
+            <a:off x="5406501" y="3630553"/>
+            <a:ext cx="5715371" cy="2585323"/>
+          </a:xfrm>
+          <a:prstGeom prst="rect">
+            <a:avLst/>
+          </a:prstGeom>
+          <a:noFill/>
+        </p:spPr>
+        <p:txBody>
+          <a:bodyPr wrap="square" rtlCol="0">
+            <a:spAutoFit/>
+          </a:bodyPr>
+          <a:lstStyle/>
+          <a:p>
+            <a:r>
+              <a:rPr lang="en-US" dirty="0"/>
+              <a:t>Format data for analysis:</a:t>
+            </a:r>
+          </a:p>
+          <a:p>
+            <a:pPr marL="800100" lvl="1" indent="-342900">
+              <a:buFont typeface="+mj-lt"/>
+              <a:buAutoNum type="arabicPeriod"/>
+            </a:pPr>
+            <a:r>
+              <a:rPr lang="en-US" dirty="0" err="1"/>
+              <a:t>Groupby</a:t>
+            </a:r>
+            <a:r>
+              <a:rPr lang="en-US" dirty="0"/>
+              <a:t> by state control</a:t>
+            </a:r>
+          </a:p>
+          <a:p>
+            <a:pPr marL="800100" lvl="1" indent="-342900">
+              <a:buFont typeface="+mj-lt"/>
+              <a:buAutoNum type="arabicPeriod"/>
+            </a:pPr>
+            <a:r>
+              <a:rPr lang="en-US" dirty="0"/>
+              <a:t>Apply the ‘mean’ functions to the columns of avg bankruptcies per 100k</a:t>
+            </a:r>
+          </a:p>
+          <a:p>
+            <a:pPr lvl="2"/>
+            <a:endParaRPr lang="en-US" dirty="0"/>
+          </a:p>
+          <a:p>
+            <a:pPr lvl="1"/>
+            <a:r>
+              <a:rPr lang="en-US" dirty="0">
+                <a:solidFill>
+                  <a:srgbClr val="FFC000"/>
+                </a:solidFill>
+              </a:rPr>
+              <a:t>*For loops to traverse dataset relatively large scale*</a:t>
+            </a:r>
+          </a:p>
+          <a:p>
+            <a:pPr lvl="1"/>
+            <a:r>
+              <a:rPr lang="en-US" dirty="0">
+                <a:solidFill>
+                  <a:srgbClr val="FFC000"/>
+                </a:solidFill>
+              </a:rPr>
+              <a:t>*Engineer around </a:t>
+            </a:r>
+            <a:r>
+              <a:rPr lang="en-US" dirty="0" err="1">
+                <a:solidFill>
+                  <a:srgbClr val="FFC000"/>
+                </a:solidFill>
+              </a:rPr>
+              <a:t>groupby</a:t>
+            </a:r>
+            <a:r>
+              <a:rPr lang="en-US" dirty="0">
+                <a:solidFill>
+                  <a:srgbClr val="FFC000"/>
+                </a:solidFill>
+              </a:rPr>
+              <a:t> limitations*</a:t>
+            </a:r>
+          </a:p>
+          <a:p>
+            <a:pPr lvl="1"/>
+            <a:r>
+              <a:rPr lang="en-US" dirty="0">
+                <a:solidFill>
+                  <a:srgbClr val="FFC000"/>
+                </a:solidFill>
+              </a:rPr>
+              <a:t>*Many decisions about when to merge or append or extract to wholly new </a:t>
+            </a:r>
+            <a:r>
+              <a:rPr lang="en-US" dirty="0" err="1">
+                <a:solidFill>
+                  <a:srgbClr val="FFC000"/>
+                </a:solidFill>
+              </a:rPr>
+              <a:t>dataframe</a:t>
+            </a:r>
+            <a:r>
+              <a:rPr lang="en-US" dirty="0">
+                <a:solidFill>
+                  <a:srgbClr val="FFC000"/>
+                </a:solidFill>
+              </a:rPr>
+              <a:t>*</a:t>
+            </a:r>
+          </a:p>
+        </p:txBody>
+      </p:sp>
+      <p:pic>
+        <p:nvPicPr>
+          <p:cNvPr id="3" name="Picture 2">
+            <a:extLst>
+              <a:ext uri="{FF2B5EF4-FFF2-40B4-BE49-F238E27FC236}">
+                <a16:creationId xmlns:a16="http://schemas.microsoft.com/office/drawing/2014/main" id="{5C064917-2BC3-4CC1-B290-7DE928466DB6}"/>
+              </a:ext>
+            </a:extLst>
+          </p:cNvPr>
+          <p:cNvPicPr>
+            <a:picLocks noChangeAspect="1"/>
+          </p:cNvPicPr>
+          <p:nvPr/>
+        </p:nvPicPr>
+        <p:blipFill>
+          <a:blip r:embed="rId2"/>
+          <a:stretch>
+            <a:fillRect/>
+          </a:stretch>
+        </p:blipFill>
+        <p:spPr>
+          <a:xfrm>
+            <a:off x="1180730" y="3810470"/>
+            <a:ext cx="3284736" cy="2762306"/>
+          </a:xfrm>
+          <a:prstGeom prst="rect">
+            <a:avLst/>
+          </a:prstGeom>
+        </p:spPr>
+      </p:pic>
+      <p:pic>
+        <p:nvPicPr>
+          <p:cNvPr id="4" name="Picture 3">
+            <a:extLst>
+              <a:ext uri="{FF2B5EF4-FFF2-40B4-BE49-F238E27FC236}">
+                <a16:creationId xmlns:a16="http://schemas.microsoft.com/office/drawing/2014/main" id="{62A3B77E-8340-40CF-B71C-4135C676226C}"/>
+              </a:ext>
+            </a:extLst>
+          </p:cNvPr>
+          <p:cNvPicPr>
+            <a:picLocks noChangeAspect="1"/>
+          </p:cNvPicPr>
+          <p:nvPr/>
+        </p:nvPicPr>
+        <p:blipFill>
+          <a:blip r:embed="rId3"/>
+          <a:stretch>
+            <a:fillRect/>
+          </a:stretch>
+        </p:blipFill>
+        <p:spPr>
+          <a:xfrm>
+            <a:off x="6005771" y="1539360"/>
+            <a:ext cx="4318959" cy="1978909"/>
+          </a:xfrm>
+          <a:prstGeom prst="rect">
+            <a:avLst/>
+          </a:prstGeom>
+        </p:spPr>
+      </p:pic>
+    </p:spTree>
+    <p:extLst>
+      <p:ext uri="{BB962C8B-B14F-4D97-AF65-F5344CB8AC3E}">
+        <p14:creationId xmlns:p14="http://schemas.microsoft.com/office/powerpoint/2010/main" val="807571354"/>
+      </p:ext>
+    </p:extLst>
+  </p:cSld>
+  <p:clrMapOvr>
+    <a:masterClrMapping/>
+  </p:clrMapOvr>
+</p:sld>
+</file>
+
+<file path=ppt/slides/slide17.xml><?xml version="1.0" encoding="utf-8"?>
+<p:sld xmlns:a="http://schemas.openxmlformats.org/drawingml/2006/main" xmlns:r="http://schemas.openxmlformats.org/officeDocument/2006/relationships" xmlns:p="http://schemas.openxmlformats.org/presentationml/2006/main">
+  <p:cSld>
+    <p:spTree>
+      <p:nvGrpSpPr>
+        <p:cNvPr id="1" name=""/>
+        <p:cNvGrpSpPr/>
+        <p:nvPr/>
+      </p:nvGrpSpPr>
+      <p:grpSpPr>
+        <a:xfrm>
+          <a:off x="0" y="0"/>
+          <a:ext cx="0" cy="0"/>
+          <a:chOff x="0" y="0"/>
+          <a:chExt cx="0" cy="0"/>
+        </a:xfrm>
+      </p:grpSpPr>
+      <p:sp>
+        <p:nvSpPr>
+          <p:cNvPr id="2" name="Title 1">
+            <a:extLst>
+              <a:ext uri="{FF2B5EF4-FFF2-40B4-BE49-F238E27FC236}">
+                <a16:creationId xmlns:a16="http://schemas.microsoft.com/office/drawing/2014/main" id="{E44F0C3C-096B-47BB-A199-2F74197A9550}"/>
+              </a:ext>
+            </a:extLst>
+          </p:cNvPr>
+          <p:cNvSpPr>
+            <a:spLocks noGrp="1"/>
+          </p:cNvSpPr>
+          <p:nvPr>
+            <p:ph type="title"/>
+          </p:nvPr>
+        </p:nvSpPr>
+        <p:spPr/>
+        <p:txBody>
+          <a:bodyPr>
+            <a:normAutofit/>
+          </a:bodyPr>
+          <a:lstStyle/>
+          <a:p>
+            <a:r>
+              <a:rPr lang="en-US" sz="2700" dirty="0"/>
+              <a:t>Henry Slide</a:t>
+            </a:r>
+            <a:br>
+              <a:rPr lang="en-US" dirty="0"/>
+            </a:br>
+            <a:r>
+              <a:rPr lang="en-US" dirty="0" err="1"/>
+              <a:t>Chapt</a:t>
+            </a:r>
+            <a:r>
+              <a:rPr lang="en-US" dirty="0"/>
+              <a:t> 7 and 13 Bankruptcy Analysis</a:t>
+            </a:r>
+          </a:p>
+        </p:txBody>
+      </p:sp>
+      <p:sp>
+        <p:nvSpPr>
+          <p:cNvPr id="3" name="TextBox 2">
+            <a:extLst>
+              <a:ext uri="{FF2B5EF4-FFF2-40B4-BE49-F238E27FC236}">
+                <a16:creationId xmlns:a16="http://schemas.microsoft.com/office/drawing/2014/main" id="{D4A8BFF3-2E05-42F1-AC3C-227C709987CC}"/>
+              </a:ext>
+            </a:extLst>
+          </p:cNvPr>
+          <p:cNvSpPr txBox="1"/>
+          <p:nvPr/>
+        </p:nvSpPr>
+        <p:spPr>
+          <a:xfrm>
+            <a:off x="6431280" y="1783080"/>
+            <a:ext cx="4720591" cy="2308324"/>
+          </a:xfrm>
+          <a:prstGeom prst="rect">
+            <a:avLst/>
+          </a:prstGeom>
+          <a:noFill/>
+        </p:spPr>
+        <p:txBody>
+          <a:bodyPr wrap="square" rtlCol="0">
+            <a:spAutoFit/>
+          </a:bodyPr>
+          <a:lstStyle/>
+          <a:p>
+            <a:r>
+              <a:rPr lang="en-US" dirty="0"/>
+              <a:t>In the top graph, we analyzed the total numbers of BKs for clusters of states by party alignment</a:t>
+            </a:r>
+          </a:p>
+          <a:p>
+            <a:pPr marL="742950" lvl="1" indent="-285750">
+              <a:buFont typeface="Arial" panose="020B0604020202020204" pitchFamily="34" charset="0"/>
+              <a:buChar char="•"/>
+            </a:pPr>
+            <a:r>
+              <a:rPr lang="en-US" dirty="0"/>
+              <a:t>Rep states tracked higher, Dem states tracked the middle throughout</a:t>
+            </a:r>
+          </a:p>
+          <a:p>
+            <a:pPr marL="742950" lvl="1" indent="-285750">
+              <a:buFont typeface="Arial" panose="020B0604020202020204" pitchFamily="34" charset="0"/>
+              <a:buChar char="•"/>
+            </a:pPr>
+            <a:r>
+              <a:rPr lang="en-US" dirty="0" err="1"/>
+              <a:t>Covid</a:t>
+            </a:r>
+            <a:r>
+              <a:rPr lang="en-US" dirty="0"/>
+              <a:t> affected them equally on a relative basis</a:t>
+            </a:r>
+          </a:p>
+          <a:p>
+            <a:pPr marL="742950" lvl="1" indent="-285750">
+              <a:buFont typeface="Arial" panose="020B0604020202020204" pitchFamily="34" charset="0"/>
+              <a:buChar char="•"/>
+            </a:pPr>
+            <a:r>
+              <a:rPr lang="en-US" dirty="0"/>
+              <a:t>All clusters experienced decline bankruptcies begin with </a:t>
+            </a:r>
+            <a:r>
+              <a:rPr lang="en-US" dirty="0" err="1"/>
+              <a:t>Covid</a:t>
+            </a:r>
+            <a:endParaRPr lang="en-US" dirty="0"/>
+          </a:p>
+        </p:txBody>
+      </p:sp>
+      <p:sp>
+        <p:nvSpPr>
+          <p:cNvPr id="5" name="TextBox 4">
+            <a:extLst>
+              <a:ext uri="{FF2B5EF4-FFF2-40B4-BE49-F238E27FC236}">
+                <a16:creationId xmlns:a16="http://schemas.microsoft.com/office/drawing/2014/main" id="{448EC734-A89D-440B-8E82-83BFDA0C8660}"/>
+              </a:ext>
+            </a:extLst>
+          </p:cNvPr>
+          <p:cNvSpPr txBox="1"/>
+          <p:nvPr/>
+        </p:nvSpPr>
+        <p:spPr>
+          <a:xfrm>
+            <a:off x="6431280" y="4129723"/>
+            <a:ext cx="4720591" cy="1754326"/>
+          </a:xfrm>
+          <a:prstGeom prst="rect">
+            <a:avLst/>
+          </a:prstGeom>
+          <a:noFill/>
+        </p:spPr>
+        <p:txBody>
+          <a:bodyPr wrap="square" rtlCol="0">
+            <a:spAutoFit/>
+          </a:bodyPr>
+          <a:lstStyle/>
+          <a:p>
+            <a:r>
+              <a:rPr lang="en-US" dirty="0"/>
+              <a:t>In the bottom graph, we analyzed the average bankruptcy filings rate per 100k</a:t>
+            </a:r>
+          </a:p>
+          <a:p>
+            <a:pPr marL="742950" lvl="1" indent="-285750">
+              <a:buFont typeface="Arial" panose="020B0604020202020204" pitchFamily="34" charset="0"/>
+              <a:buChar char="•"/>
+            </a:pPr>
+            <a:r>
+              <a:rPr lang="en-US" dirty="0"/>
+              <a:t>Dem + </a:t>
+            </a:r>
+            <a:r>
+              <a:rPr lang="en-US" dirty="0" err="1"/>
+              <a:t>Div</a:t>
+            </a:r>
+            <a:r>
+              <a:rPr lang="en-US" dirty="0"/>
+              <a:t> states tracked more closely</a:t>
+            </a:r>
+          </a:p>
+          <a:p>
+            <a:pPr marL="742950" lvl="1" indent="-285750">
+              <a:buFont typeface="Arial" panose="020B0604020202020204" pitchFamily="34" charset="0"/>
+              <a:buChar char="•"/>
+            </a:pPr>
+            <a:r>
+              <a:rPr lang="en-US" dirty="0"/>
+              <a:t>Rep states tracked higher than Dem or </a:t>
+            </a:r>
+            <a:r>
+              <a:rPr lang="en-US" dirty="0" err="1"/>
+              <a:t>Div</a:t>
+            </a:r>
+            <a:endParaRPr lang="en-US" dirty="0"/>
+          </a:p>
+          <a:p>
+            <a:pPr marL="742950" lvl="1" indent="-285750">
+              <a:buFont typeface="Arial" panose="020B0604020202020204" pitchFamily="34" charset="0"/>
+              <a:buChar char="•"/>
+            </a:pPr>
+            <a:endParaRPr lang="en-US" dirty="0"/>
+          </a:p>
+        </p:txBody>
+      </p:sp>
+      <p:pic>
+        <p:nvPicPr>
+          <p:cNvPr id="8" name="Picture 7">
+            <a:extLst>
+              <a:ext uri="{FF2B5EF4-FFF2-40B4-BE49-F238E27FC236}">
+                <a16:creationId xmlns:a16="http://schemas.microsoft.com/office/drawing/2014/main" id="{6383B1CD-1CF4-4EF5-B92F-CB19D8C1FF42}"/>
+              </a:ext>
+            </a:extLst>
+          </p:cNvPr>
+          <p:cNvPicPr>
+            <a:picLocks noChangeAspect="1"/>
+          </p:cNvPicPr>
+          <p:nvPr/>
+        </p:nvPicPr>
+        <p:blipFill>
+          <a:blip r:embed="rId2"/>
+          <a:stretch>
+            <a:fillRect/>
+          </a:stretch>
+        </p:blipFill>
+        <p:spPr>
+          <a:xfrm>
+            <a:off x="1040129" y="1637420"/>
+            <a:ext cx="4945380" cy="2293917"/>
+          </a:xfrm>
+          <a:prstGeom prst="rect">
+            <a:avLst/>
+          </a:prstGeom>
+        </p:spPr>
+      </p:pic>
+      <p:pic>
+        <p:nvPicPr>
+          <p:cNvPr id="9" name="Picture 8">
+            <a:extLst>
+              <a:ext uri="{FF2B5EF4-FFF2-40B4-BE49-F238E27FC236}">
+                <a16:creationId xmlns:a16="http://schemas.microsoft.com/office/drawing/2014/main" id="{9DAA6862-7927-49C5-875D-A337C6BE9AB7}"/>
+              </a:ext>
+            </a:extLst>
+          </p:cNvPr>
+          <p:cNvPicPr>
+            <a:picLocks noChangeAspect="1"/>
+          </p:cNvPicPr>
+          <p:nvPr/>
+        </p:nvPicPr>
+        <p:blipFill>
+          <a:blip r:embed="rId3"/>
+          <a:stretch>
+            <a:fillRect/>
+          </a:stretch>
+        </p:blipFill>
+        <p:spPr>
+          <a:xfrm>
+            <a:off x="1040911" y="4012702"/>
+            <a:ext cx="4944598" cy="2438434"/>
+          </a:xfrm>
+          <a:prstGeom prst="rect">
+            <a:avLst/>
+          </a:prstGeom>
+        </p:spPr>
+      </p:pic>
+    </p:spTree>
+    <p:extLst>
+      <p:ext uri="{BB962C8B-B14F-4D97-AF65-F5344CB8AC3E}">
+        <p14:creationId xmlns:p14="http://schemas.microsoft.com/office/powerpoint/2010/main" val="500016260"/>
+      </p:ext>
+    </p:extLst>
+  </p:cSld>
+  <p:clrMapOvr>
+    <a:masterClrMapping/>
+  </p:clrMapOvr>
+</p:sld>
+</file>
+
+<file path=ppt/slides/slide18.xml><?xml version="1.0" encoding="utf-8"?>
+<p:sld xmlns:a="http://schemas.openxmlformats.org/drawingml/2006/main" xmlns:r="http://schemas.openxmlformats.org/officeDocument/2006/relationships" xmlns:p="http://schemas.openxmlformats.org/presentationml/2006/main">
+  <p:cSld>
+    <p:spTree>
+      <p:nvGrpSpPr>
+        <p:cNvPr id="1" name=""/>
+        <p:cNvGrpSpPr/>
+        <p:nvPr/>
+      </p:nvGrpSpPr>
+      <p:grpSpPr>
+        <a:xfrm>
+          <a:off x="0" y="0"/>
+          <a:ext cx="0" cy="0"/>
+          <a:chOff x="0" y="0"/>
+          <a:chExt cx="0" cy="0"/>
+        </a:xfrm>
+      </p:grpSpPr>
+      <p:sp>
+        <p:nvSpPr>
+          <p:cNvPr id="2" name="Title 1">
+            <a:extLst>
+              <a:ext uri="{FF2B5EF4-FFF2-40B4-BE49-F238E27FC236}">
+                <a16:creationId xmlns:a16="http://schemas.microsoft.com/office/drawing/2014/main" id="{3E235A5A-3EB3-4BD6-9271-FCBE19079F9A}"/>
+              </a:ext>
+            </a:extLst>
+          </p:cNvPr>
+          <p:cNvSpPr>
+            <a:spLocks noGrp="1"/>
+          </p:cNvSpPr>
+          <p:nvPr>
+            <p:ph type="title"/>
+          </p:nvPr>
+        </p:nvSpPr>
+        <p:spPr/>
+        <p:txBody>
+          <a:bodyPr>
+            <a:normAutofit/>
+          </a:bodyPr>
+          <a:lstStyle/>
+          <a:p>
+            <a:r>
+              <a:rPr lang="en-US" sz="2700" dirty="0"/>
+              <a:t>Henry Slide</a:t>
+            </a:r>
+            <a:br>
+              <a:rPr lang="en-US" dirty="0"/>
+            </a:br>
+            <a:r>
+              <a:rPr lang="en-US" dirty="0"/>
+              <a:t>Chap 13 &amp; 7 Bankruptcy Implications</a:t>
+            </a:r>
+          </a:p>
+        </p:txBody>
+      </p:sp>
+      <p:sp>
+        <p:nvSpPr>
+          <p:cNvPr id="4" name="Content Placeholder 3">
+            <a:extLst>
+              <a:ext uri="{FF2B5EF4-FFF2-40B4-BE49-F238E27FC236}">
+                <a16:creationId xmlns:a16="http://schemas.microsoft.com/office/drawing/2014/main" id="{559B0A82-D77C-492B-8595-F7D54FCC7E2E}"/>
+              </a:ext>
+            </a:extLst>
+          </p:cNvPr>
+          <p:cNvSpPr>
+            <a:spLocks noGrp="1"/>
+          </p:cNvSpPr>
+          <p:nvPr>
+            <p:ph idx="1"/>
+          </p:nvPr>
+        </p:nvSpPr>
+        <p:spPr>
+          <a:xfrm>
+            <a:off x="575240" y="1833245"/>
+            <a:ext cx="11041520" cy="4351338"/>
+          </a:xfrm>
+        </p:spPr>
+        <p:txBody>
+          <a:bodyPr>
+            <a:normAutofit/>
+          </a:bodyPr>
+          <a:lstStyle/>
+          <a:p>
+            <a:pPr marL="0" indent="0">
+              <a:buNone/>
+            </a:pPr>
+            <a:r>
+              <a:rPr lang="en-US" dirty="0"/>
+              <a:t>Based on the data, we can infer:</a:t>
+            </a:r>
+          </a:p>
+          <a:p>
+            <a:pPr marL="914400" lvl="1" indent="-457200">
+              <a:buFont typeface="+mj-lt"/>
+              <a:buAutoNum type="arabicPeriod"/>
+            </a:pPr>
+            <a:r>
+              <a:rPr lang="en-US" dirty="0"/>
+              <a:t>The advent and continued presence of the pandemic seems to have provided a pause in the number of Chapter 13 and 7 bankruptcies.</a:t>
+            </a:r>
+          </a:p>
+          <a:p>
+            <a:pPr lvl="2"/>
+            <a:r>
+              <a:rPr lang="en-US" dirty="0" err="1"/>
+              <a:t>Covid</a:t>
+            </a:r>
+            <a:r>
+              <a:rPr lang="en-US" dirty="0"/>
+              <a:t> stimulus may have staved off urgency</a:t>
+            </a:r>
+          </a:p>
+          <a:p>
+            <a:pPr lvl="2"/>
+            <a:r>
+              <a:rPr lang="en-US" dirty="0"/>
+              <a:t>Courts shut down or slowed, affecting bankruptcy processing</a:t>
+            </a:r>
+          </a:p>
+          <a:p>
+            <a:pPr marL="914400" lvl="1" indent="-457200">
+              <a:buFont typeface="+mj-lt"/>
+              <a:buAutoNum type="arabicPeriod"/>
+            </a:pPr>
+            <a:r>
+              <a:rPr lang="en-US" dirty="0"/>
+              <a:t>The disparity of bankruptcies in Rep states vs. the rest may reflect rust belt and rural economics, or financial literacy and related social issues.</a:t>
+            </a:r>
+          </a:p>
+          <a:p>
+            <a:pPr marL="457200" lvl="1" indent="0">
+              <a:buNone/>
+            </a:pPr>
+            <a:endParaRPr lang="en-US" dirty="0"/>
+          </a:p>
+          <a:p>
+            <a:pPr marL="0" indent="0">
+              <a:buNone/>
+            </a:pPr>
+            <a:r>
+              <a:rPr lang="en-US" dirty="0">
+                <a:solidFill>
+                  <a:srgbClr val="FFC000"/>
+                </a:solidFill>
+              </a:rPr>
+              <a:t>These findings were not expected.  We thought the pandemic economic disruption might affect blue vs. red states differentially.</a:t>
+            </a:r>
+            <a:endParaRPr lang="en-US" dirty="0"/>
+          </a:p>
+        </p:txBody>
+      </p:sp>
+    </p:spTree>
+    <p:extLst>
+      <p:ext uri="{BB962C8B-B14F-4D97-AF65-F5344CB8AC3E}">
+        <p14:creationId xmlns:p14="http://schemas.microsoft.com/office/powerpoint/2010/main" val="3449730019"/>
+      </p:ext>
+    </p:extLst>
+  </p:cSld>
+  <p:clrMapOvr>
+    <a:masterClrMapping/>
+  </p:clrMapOvr>
+</p:sld>
+</file>
+
+<file path=ppt/slides/slide19.xml><?xml version="1.0" encoding="utf-8"?>
+<p:sld xmlns:a="http://schemas.openxmlformats.org/drawingml/2006/main" xmlns:r="http://schemas.openxmlformats.org/officeDocument/2006/relationships" xmlns:p="http://schemas.openxmlformats.org/presentationml/2006/main">
+  <p:cSld>
+    <p:spTree>
+      <p:nvGrpSpPr>
+        <p:cNvPr id="1" name=""/>
+        <p:cNvGrpSpPr/>
+        <p:nvPr/>
+      </p:nvGrpSpPr>
+      <p:grpSpPr>
+        <a:xfrm>
+          <a:off x="0" y="0"/>
+          <a:ext cx="0" cy="0"/>
+          <a:chOff x="0" y="0"/>
+          <a:chExt cx="0" cy="0"/>
+        </a:xfrm>
+      </p:grpSpPr>
+      <p:sp>
+        <p:nvSpPr>
+          <p:cNvPr id="2" name="Title 1">
+            <a:extLst>
+              <a:ext uri="{FF2B5EF4-FFF2-40B4-BE49-F238E27FC236}">
+                <a16:creationId xmlns:a16="http://schemas.microsoft.com/office/drawing/2014/main" id="{645FD969-10FF-45CB-BF9B-58EAD1275A38}"/>
+              </a:ext>
+            </a:extLst>
+          </p:cNvPr>
+          <p:cNvSpPr>
+            <a:spLocks noGrp="1"/>
+          </p:cNvSpPr>
+          <p:nvPr>
+            <p:ph type="title"/>
+          </p:nvPr>
+        </p:nvSpPr>
+        <p:spPr/>
+        <p:txBody>
+          <a:bodyPr/>
+          <a:lstStyle/>
+          <a:p>
+            <a:r>
+              <a:rPr lang="en-US" dirty="0"/>
+              <a:t>Conclusions and Impact</a:t>
+            </a:r>
+          </a:p>
+        </p:txBody>
+      </p:sp>
+      <p:sp>
+        <p:nvSpPr>
+          <p:cNvPr id="3" name="Content Placeholder 2">
+            <a:extLst>
+              <a:ext uri="{FF2B5EF4-FFF2-40B4-BE49-F238E27FC236}">
+                <a16:creationId xmlns:a16="http://schemas.microsoft.com/office/drawing/2014/main" id="{18E59BD6-9A93-46AF-A3F5-FA4BAF25454E}"/>
+              </a:ext>
+            </a:extLst>
+          </p:cNvPr>
+          <p:cNvSpPr>
+            <a:spLocks noGrp="1"/>
+          </p:cNvSpPr>
+          <p:nvPr>
+            <p:ph idx="1"/>
+          </p:nvPr>
+        </p:nvSpPr>
+        <p:spPr/>
+        <p:txBody>
+          <a:bodyPr/>
+          <a:lstStyle/>
+          <a:p>
+            <a:r>
+              <a:rPr lang="en-US" dirty="0"/>
+              <a:t>State level political affiliation</a:t>
+            </a:r>
+          </a:p>
+          <a:p>
+            <a:pPr lvl="1"/>
+            <a:r>
+              <a:rPr lang="en-US" dirty="0"/>
+              <a:t>Correlates to rates of new infection</a:t>
+            </a:r>
+          </a:p>
+          <a:p>
+            <a:pPr lvl="1"/>
+            <a:r>
+              <a:rPr lang="en-US" dirty="0"/>
+              <a:t>Correlates to unemployment rates</a:t>
+            </a:r>
+          </a:p>
+          <a:p>
+            <a:pPr lvl="1"/>
+            <a:r>
+              <a:rPr lang="en-US" dirty="0"/>
+              <a:t>Does not correlate to under-reporting Covid-19 deaths</a:t>
+            </a:r>
+          </a:p>
+          <a:p>
+            <a:pPr lvl="1"/>
+            <a:r>
+              <a:rPr lang="en-US" dirty="0"/>
+              <a:t>Does not correlate to Chapter 7 and 13 bankruptcies</a:t>
+            </a:r>
+          </a:p>
+          <a:p>
+            <a:r>
+              <a:rPr lang="en-US" dirty="0"/>
+              <a:t>Pandemic initially correlated equally by race and ethnicity, but more recently seems to have impacted minorities more disproportionately</a:t>
+            </a:r>
+          </a:p>
+          <a:p>
+            <a:r>
+              <a:rPr lang="en-US" dirty="0"/>
+              <a:t>Pandemic is greatly accelerating long-term unemployment rates</a:t>
+            </a:r>
+          </a:p>
+        </p:txBody>
+      </p:sp>
+    </p:spTree>
+    <p:extLst>
+      <p:ext uri="{BB962C8B-B14F-4D97-AF65-F5344CB8AC3E}">
+        <p14:creationId xmlns:p14="http://schemas.microsoft.com/office/powerpoint/2010/main" val="1914500263"/>
       </p:ext>
     </p:extLst>
   </p:cSld>
@@ -7081,10 +8365,194 @@
       </p:grpSpPr>
       <p:sp>
         <p:nvSpPr>
+          <p:cNvPr id="4" name="Title 3">
+            <a:extLst>
+              <a:ext uri="{FF2B5EF4-FFF2-40B4-BE49-F238E27FC236}">
+                <a16:creationId xmlns:a16="http://schemas.microsoft.com/office/drawing/2014/main" id="{105FA492-BA0B-441A-AA07-7BCFD41B51B1}"/>
+              </a:ext>
+            </a:extLst>
+          </p:cNvPr>
+          <p:cNvSpPr>
+            <a:spLocks noGrp="1"/>
+          </p:cNvSpPr>
+          <p:nvPr>
+            <p:ph type="title"/>
+          </p:nvPr>
+        </p:nvSpPr>
+        <p:spPr/>
+        <p:txBody>
+          <a:bodyPr>
+            <a:normAutofit/>
+          </a:bodyPr>
+          <a:lstStyle/>
+          <a:p>
+            <a:r>
+              <a:rPr lang="en-US" dirty="0"/>
+              <a:t>“Group Sixers” Team</a:t>
+            </a:r>
+          </a:p>
+        </p:txBody>
+      </p:sp>
+      <p:sp>
+        <p:nvSpPr>
+          <p:cNvPr id="5" name="Content Placeholder 4">
+            <a:extLst>
+              <a:ext uri="{FF2B5EF4-FFF2-40B4-BE49-F238E27FC236}">
+                <a16:creationId xmlns:a16="http://schemas.microsoft.com/office/drawing/2014/main" id="{722B372B-5682-4D94-B62D-C6A21C1A3A0F}"/>
+              </a:ext>
+            </a:extLst>
+          </p:cNvPr>
+          <p:cNvSpPr>
+            <a:spLocks noGrp="1"/>
+          </p:cNvSpPr>
+          <p:nvPr>
+            <p:ph sz="half" idx="1"/>
+          </p:nvPr>
+        </p:nvSpPr>
+        <p:spPr/>
+        <p:txBody>
+          <a:bodyPr>
+            <a:normAutofit/>
+          </a:bodyPr>
+          <a:lstStyle/>
+          <a:p>
+            <a:r>
+              <a:rPr lang="en-US" sz="4000" dirty="0"/>
+              <a:t>Adrian Salas</a:t>
+            </a:r>
+          </a:p>
+          <a:p>
+            <a:r>
+              <a:rPr lang="en-US" sz="4000" dirty="0"/>
+              <a:t>Brooke Cooper</a:t>
+            </a:r>
+          </a:p>
+          <a:p>
+            <a:r>
+              <a:rPr lang="en-US" sz="4000" dirty="0"/>
+              <a:t>Marilou Francis</a:t>
+            </a:r>
+          </a:p>
+        </p:txBody>
+      </p:sp>
+      <p:sp>
+        <p:nvSpPr>
+          <p:cNvPr id="6" name="Content Placeholder 5">
+            <a:extLst>
+              <a:ext uri="{FF2B5EF4-FFF2-40B4-BE49-F238E27FC236}">
+                <a16:creationId xmlns:a16="http://schemas.microsoft.com/office/drawing/2014/main" id="{7BFC85A4-2B94-4E13-B689-5413A0DCFC25}"/>
+              </a:ext>
+            </a:extLst>
+          </p:cNvPr>
+          <p:cNvSpPr>
+            <a:spLocks noGrp="1"/>
+          </p:cNvSpPr>
+          <p:nvPr>
+            <p:ph sz="half" idx="2"/>
+          </p:nvPr>
+        </p:nvSpPr>
+        <p:spPr/>
+        <p:txBody>
+          <a:bodyPr>
+            <a:normAutofit/>
+          </a:bodyPr>
+          <a:lstStyle/>
+          <a:p>
+            <a:r>
+              <a:rPr lang="en-US" sz="4000" dirty="0"/>
+              <a:t>Steven Rigby</a:t>
+            </a:r>
+          </a:p>
+          <a:p>
+            <a:r>
+              <a:rPr lang="en-US" sz="4000" dirty="0"/>
+              <a:t>Henry Tran</a:t>
+            </a:r>
+          </a:p>
+          <a:p>
+            <a:r>
+              <a:rPr lang="en-US" sz="4000" dirty="0"/>
+              <a:t>Joseph </a:t>
+            </a:r>
+            <a:r>
+              <a:rPr lang="en-US" sz="4000" dirty="0" err="1"/>
+              <a:t>Verghese</a:t>
+            </a:r>
+            <a:endParaRPr lang="en-US" sz="4000" dirty="0"/>
+          </a:p>
+        </p:txBody>
+      </p:sp>
+      <p:sp>
+        <p:nvSpPr>
+          <p:cNvPr id="9" name="TextBox 8">
+            <a:extLst>
+              <a:ext uri="{FF2B5EF4-FFF2-40B4-BE49-F238E27FC236}">
+                <a16:creationId xmlns:a16="http://schemas.microsoft.com/office/drawing/2014/main" id="{8D449BA3-23E0-4411-8610-E4C2F790CB4A}"/>
+              </a:ext>
+            </a:extLst>
+          </p:cNvPr>
+          <p:cNvSpPr txBox="1"/>
+          <p:nvPr/>
+        </p:nvSpPr>
+        <p:spPr>
+          <a:xfrm>
+            <a:off x="3193104" y="4709652"/>
+            <a:ext cx="5643716" cy="461665"/>
+          </a:xfrm>
+          <a:prstGeom prst="rect">
+            <a:avLst/>
+          </a:prstGeom>
+          <a:noFill/>
+        </p:spPr>
+        <p:txBody>
+          <a:bodyPr wrap="square" rtlCol="0">
+            <a:spAutoFit/>
+          </a:bodyPr>
+          <a:lstStyle/>
+          <a:p>
+            <a:r>
+              <a:rPr lang="en-US" sz="2400" i="1" dirty="0"/>
+              <a:t>”Better Living Through Data… Lots of It!”</a:t>
+            </a:r>
+          </a:p>
+        </p:txBody>
+      </p:sp>
+    </p:spTree>
+    <p:extLst>
+      <p:ext uri="{BB962C8B-B14F-4D97-AF65-F5344CB8AC3E}">
+        <p14:creationId xmlns:p14="http://schemas.microsoft.com/office/powerpoint/2010/main" val="2112855681"/>
+      </p:ext>
+    </p:extLst>
+  </p:cSld>
+  <p:clrMapOvr>
+    <a:masterClrMapping/>
+  </p:clrMapOvr>
+</p:sld>
+</file>
+
+<file path=ppt/slides/slide20.xml><?xml version="1.0" encoding="utf-8"?>
+<p:sld xmlns:a="http://schemas.openxmlformats.org/drawingml/2006/main" xmlns:r="http://schemas.openxmlformats.org/officeDocument/2006/relationships" xmlns:p="http://schemas.openxmlformats.org/presentationml/2006/main">
+  <p:cSld>
+    <p:spTree>
+      <p:nvGrpSpPr>
+        <p:cNvPr id="1" name=""/>
+        <p:cNvGrpSpPr/>
+        <p:nvPr/>
+      </p:nvGrpSpPr>
+      <p:grpSpPr>
+        <a:xfrm>
+          <a:off x="0" y="0"/>
+          <a:ext cx="0" cy="0"/>
+          <a:chOff x="0" y="0"/>
+          <a:chExt cx="0" cy="0"/>
+        </a:xfrm>
+      </p:grpSpPr>
+      <p:sp>
+        <p:nvSpPr>
           <p:cNvPr id="2" name="Title 1">
             <a:extLst>
               <a:ext uri="{FF2B5EF4-FFF2-40B4-BE49-F238E27FC236}">
-                <a16:creationId xmlns:a16="http://schemas.microsoft.com/office/drawing/2014/main" id="{44002BC8-4F2B-4E80-8A74-9DDFF9889BB8}"/>
+                <a16:creationId xmlns:a16="http://schemas.microsoft.com/office/drawing/2014/main" id="{87B3CCE1-2026-41E0-9A18-F20B1743FFAE}"/>
               </a:ext>
             </a:extLst>
           </p:cNvPr>
@@ -7098,20 +8566,13 @@
         <p:spPr/>
         <p:txBody>
           <a:bodyPr>
-            <a:normAutofit/>
+            <a:normAutofit fontScale="90000"/>
           </a:bodyPr>
           <a:lstStyle/>
           <a:p>
             <a:r>
-              <a:rPr lang="en-US" sz="2400" dirty="0"/>
-              <a:t>Brooke / Adrian Slide</a:t>
-            </a:r>
-            <a:br>
-              <a:rPr lang="en-US" dirty="0"/>
-            </a:br>
-            <a:r>
-              <a:rPr lang="en-US" dirty="0"/>
-              <a:t>Questions</a:t>
+              <a:rPr lang="en-US" dirty="0"/>
+              <a:t>Difficulties and Further Considerations</a:t>
             </a:r>
           </a:p>
         </p:txBody>
@@ -7121,7 +8582,7 @@
           <p:cNvPr id="3" name="Content Placeholder 2">
             <a:extLst>
               <a:ext uri="{FF2B5EF4-FFF2-40B4-BE49-F238E27FC236}">
-                <a16:creationId xmlns:a16="http://schemas.microsoft.com/office/drawing/2014/main" id="{6A204486-3E6B-41C8-A243-E703CA58EA37}"/>
+                <a16:creationId xmlns:a16="http://schemas.microsoft.com/office/drawing/2014/main" id="{80314EA5-36F3-4A47-9B03-552F627F799A}"/>
               </a:ext>
             </a:extLst>
           </p:cNvPr>
@@ -7134,49 +8595,32 @@
         </p:nvSpPr>
         <p:spPr/>
         <p:txBody>
-          <a:bodyPr>
-            <a:normAutofit lnSpcReduction="10000"/>
-          </a:bodyPr>
-          <a:lstStyle/>
-          <a:p>
-            <a:r>
-              <a:rPr lang="en-US" dirty="0"/>
-              <a:t>Are politics coloring reporting on the pandemic’s true death toll at the state level?</a:t>
-            </a:r>
-          </a:p>
-          <a:p>
-            <a:r>
-              <a:rPr lang="en-US" dirty="0"/>
-              <a:t>How are politics affecting unemployment in the face of pandemic at the state level?</a:t>
-            </a:r>
-          </a:p>
-          <a:p>
-            <a:r>
-              <a:rPr lang="en-US" dirty="0"/>
-              <a:t>How are politics affecting bankruptcies in the face of pandemic at the state level?</a:t>
-            </a:r>
-          </a:p>
-          <a:p>
-            <a:r>
-              <a:rPr lang="en-US" dirty="0"/>
-              <a:t>Is the pandemic differentially impacting on the basis of race and ethnicity for the entire country?</a:t>
-            </a:r>
-          </a:p>
-          <a:p>
-            <a:r>
-              <a:rPr lang="en-US" dirty="0"/>
-              <a:t>Also, how is the pandemic affecting long-term unemployment rates for the entire country?</a:t>
-            </a:r>
-          </a:p>
-          <a:p>
-            <a:endParaRPr lang="en-US" dirty="0"/>
+          <a:bodyPr/>
+          <a:lstStyle/>
+          <a:p>
+            <a:r>
+              <a:rPr lang="en-US" dirty="0"/>
+              <a:t>Multiple factors we were unable to measure for</a:t>
+            </a:r>
+          </a:p>
+          <a:p>
+            <a:r>
+              <a:rPr lang="en-US" dirty="0"/>
+              <a:t>Not enough time to time slice for leading and lagging indicators</a:t>
+            </a:r>
+          </a:p>
+          <a:p>
+            <a:r>
+              <a:rPr lang="en-US" dirty="0"/>
+              <a:t>We would like to have had enough time to perform more variance and standard deviation analysis</a:t>
+            </a:r>
           </a:p>
         </p:txBody>
       </p:sp>
     </p:spTree>
     <p:extLst>
       <p:ext uri="{BB962C8B-B14F-4D97-AF65-F5344CB8AC3E}">
-        <p14:creationId xmlns:p14="http://schemas.microsoft.com/office/powerpoint/2010/main" val="1614364205"/>
+        <p14:creationId xmlns:p14="http://schemas.microsoft.com/office/powerpoint/2010/main" val="1332136975"/>
       </p:ext>
     </p:extLst>
   </p:cSld>
@@ -7208,7 +8652,7 @@
           <p:cNvPr id="2" name="Title 1">
             <a:extLst>
               <a:ext uri="{FF2B5EF4-FFF2-40B4-BE49-F238E27FC236}">
-                <a16:creationId xmlns:a16="http://schemas.microsoft.com/office/drawing/2014/main" id="{50577E2B-0260-480A-97F3-B4AB4CC18498}"/>
+                <a16:creationId xmlns:a16="http://schemas.microsoft.com/office/drawing/2014/main" id="{44002BC8-4F2B-4E80-8A74-9DDFF9889BB8}"/>
               </a:ext>
             </a:extLst>
           </p:cNvPr>
@@ -7235,7 +8679,7 @@
             </a:br>
             <a:r>
               <a:rPr lang="en-US" dirty="0"/>
-              <a:t>Why Pursue These Questions?</a:t>
+              <a:t>Questions</a:t>
             </a:r>
           </a:p>
         </p:txBody>
@@ -7245,7 +8689,7 @@
           <p:cNvPr id="3" name="Content Placeholder 2">
             <a:extLst>
               <a:ext uri="{FF2B5EF4-FFF2-40B4-BE49-F238E27FC236}">
-                <a16:creationId xmlns:a16="http://schemas.microsoft.com/office/drawing/2014/main" id="{1B058B19-CCD8-413B-B57A-A6CD09B6892C}"/>
+                <a16:creationId xmlns:a16="http://schemas.microsoft.com/office/drawing/2014/main" id="{6A204486-3E6B-41C8-A243-E703CA58EA37}"/>
               </a:ext>
             </a:extLst>
           </p:cNvPr>
@@ -7258,38 +8702,49 @@
         </p:nvSpPr>
         <p:spPr/>
         <p:txBody>
-          <a:bodyPr/>
-          <a:lstStyle/>
-          <a:p>
-            <a:r>
-              <a:rPr lang="en-US" dirty="0"/>
-              <a:t>Grim failure to manage the pandemic well in the US, thus far</a:t>
-            </a:r>
-          </a:p>
-          <a:p>
-            <a:r>
-              <a:rPr lang="en-US" dirty="0"/>
-              <a:t>Highly polarized political environment, with a major election that took place in the same year the pandemic hit US shores</a:t>
-            </a:r>
-          </a:p>
-          <a:p>
-            <a:r>
-              <a:rPr lang="en-US" dirty="0"/>
-              <a:t>The pandemic is clearly stressing the country economically </a:t>
-            </a:r>
-          </a:p>
-          <a:p>
-            <a:r>
-              <a:rPr lang="en-US" dirty="0"/>
-              <a:t>The pandemic seems to be magnifying the effects of pre-existing disparities on the basis of race and ethnicity (income, access, etc.)</a:t>
-            </a:r>
+          <a:bodyPr>
+            <a:normAutofit lnSpcReduction="10000"/>
+          </a:bodyPr>
+          <a:lstStyle/>
+          <a:p>
+            <a:r>
+              <a:rPr lang="en-US" dirty="0"/>
+              <a:t>Are politics coloring reporting on the pandemic’s true death toll at the state level?</a:t>
+            </a:r>
+          </a:p>
+          <a:p>
+            <a:r>
+              <a:rPr lang="en-US" dirty="0"/>
+              <a:t>How are politics affecting unemployment in the face of pandemic at the state level?</a:t>
+            </a:r>
+          </a:p>
+          <a:p>
+            <a:r>
+              <a:rPr lang="en-US" dirty="0"/>
+              <a:t>How are politics affecting bankruptcies in the face of pandemic at the state level?</a:t>
+            </a:r>
+          </a:p>
+          <a:p>
+            <a:r>
+              <a:rPr lang="en-US" dirty="0"/>
+              <a:t>Is the pandemic differentially impacting on the basis of race and ethnicity for the entire country?</a:t>
+            </a:r>
+          </a:p>
+          <a:p>
+            <a:r>
+              <a:rPr lang="en-US" dirty="0"/>
+              <a:t>Also, how is the pandemic affecting long-term unemployment rates for the entire country?</a:t>
+            </a:r>
+          </a:p>
+          <a:p>
+            <a:endParaRPr lang="en-US" dirty="0"/>
           </a:p>
         </p:txBody>
       </p:sp>
     </p:spTree>
     <p:extLst>
       <p:ext uri="{BB962C8B-B14F-4D97-AF65-F5344CB8AC3E}">
-        <p14:creationId xmlns:p14="http://schemas.microsoft.com/office/powerpoint/2010/main" val="3085546572"/>
+        <p14:creationId xmlns:p14="http://schemas.microsoft.com/office/powerpoint/2010/main" val="1614364205"/>
       </p:ext>
     </p:extLst>
   </p:cSld>
@@ -7321,6 +8776,119 @@
           <p:cNvPr id="2" name="Title 1">
             <a:extLst>
               <a:ext uri="{FF2B5EF4-FFF2-40B4-BE49-F238E27FC236}">
+                <a16:creationId xmlns:a16="http://schemas.microsoft.com/office/drawing/2014/main" id="{50577E2B-0260-480A-97F3-B4AB4CC18498}"/>
+              </a:ext>
+            </a:extLst>
+          </p:cNvPr>
+          <p:cNvSpPr>
+            <a:spLocks noGrp="1"/>
+          </p:cNvSpPr>
+          <p:nvPr>
+            <p:ph type="title"/>
+          </p:nvPr>
+        </p:nvSpPr>
+        <p:spPr/>
+        <p:txBody>
+          <a:bodyPr>
+            <a:normAutofit/>
+          </a:bodyPr>
+          <a:lstStyle/>
+          <a:p>
+            <a:r>
+              <a:rPr lang="en-US" sz="2400" dirty="0"/>
+              <a:t>Brooke / Adrian Slide</a:t>
+            </a:r>
+            <a:br>
+              <a:rPr lang="en-US" dirty="0"/>
+            </a:br>
+            <a:r>
+              <a:rPr lang="en-US" dirty="0"/>
+              <a:t>Why Pursue These Questions?</a:t>
+            </a:r>
+          </a:p>
+        </p:txBody>
+      </p:sp>
+      <p:sp>
+        <p:nvSpPr>
+          <p:cNvPr id="3" name="Content Placeholder 2">
+            <a:extLst>
+              <a:ext uri="{FF2B5EF4-FFF2-40B4-BE49-F238E27FC236}">
+                <a16:creationId xmlns:a16="http://schemas.microsoft.com/office/drawing/2014/main" id="{1B058B19-CCD8-413B-B57A-A6CD09B6892C}"/>
+              </a:ext>
+            </a:extLst>
+          </p:cNvPr>
+          <p:cNvSpPr>
+            <a:spLocks noGrp="1"/>
+          </p:cNvSpPr>
+          <p:nvPr>
+            <p:ph idx="1"/>
+          </p:nvPr>
+        </p:nvSpPr>
+        <p:spPr/>
+        <p:txBody>
+          <a:bodyPr/>
+          <a:lstStyle/>
+          <a:p>
+            <a:r>
+              <a:rPr lang="en-US" dirty="0"/>
+              <a:t>Grim failure to manage the pandemic well in the US, thus far</a:t>
+            </a:r>
+          </a:p>
+          <a:p>
+            <a:r>
+              <a:rPr lang="en-US" dirty="0"/>
+              <a:t>Highly polarized political environment, with a major election that took place in the same year the pandemic hit US shores</a:t>
+            </a:r>
+          </a:p>
+          <a:p>
+            <a:r>
+              <a:rPr lang="en-US" dirty="0"/>
+              <a:t>The pandemic is clearly stressing the country economically </a:t>
+            </a:r>
+          </a:p>
+          <a:p>
+            <a:r>
+              <a:rPr lang="en-US" dirty="0"/>
+              <a:t>The pandemic seems to be magnifying the effects of pre-existing disparities on the basis of race and ethnicity (income, access, etc.)</a:t>
+            </a:r>
+          </a:p>
+        </p:txBody>
+      </p:sp>
+    </p:spTree>
+    <p:extLst>
+      <p:ext uri="{BB962C8B-B14F-4D97-AF65-F5344CB8AC3E}">
+        <p14:creationId xmlns:p14="http://schemas.microsoft.com/office/powerpoint/2010/main" val="3085546572"/>
+      </p:ext>
+    </p:extLst>
+  </p:cSld>
+  <p:clrMapOvr>
+    <a:masterClrMapping/>
+  </p:clrMapOvr>
+</p:sld>
+</file>
+
+<file path=ppt/slides/slide5.xml><?xml version="1.0" encoding="utf-8"?>
+<p:sld xmlns:a="http://schemas.openxmlformats.org/drawingml/2006/main" xmlns:r="http://schemas.openxmlformats.org/officeDocument/2006/relationships" xmlns:p="http://schemas.openxmlformats.org/presentationml/2006/main">
+  <p:cSld>
+    <p:spTree>
+      <p:nvGrpSpPr>
+        <p:cNvPr id="1" name=""/>
+        <p:cNvGrpSpPr/>
+        <p:nvPr/>
+      </p:nvGrpSpPr>
+      <p:grpSpPr>
+        <a:xfrm>
+          <a:off x="0" y="0"/>
+          <a:ext cx="0" cy="0"/>
+          <a:chOff x="0" y="0"/>
+          <a:chExt cx="0" cy="0"/>
+        </a:xfrm>
+      </p:grpSpPr>
+      <p:sp>
+        <p:nvSpPr>
+          <p:cNvPr id="2" name="Title 1">
+            <a:extLst>
+              <a:ext uri="{FF2B5EF4-FFF2-40B4-BE49-F238E27FC236}">
                 <a16:creationId xmlns:a16="http://schemas.microsoft.com/office/drawing/2014/main" id="{E02AABAF-448B-4D6A-98F0-31C63D31B459}"/>
               </a:ext>
             </a:extLst>
@@ -7341,15 +8909,7 @@
           <a:p>
             <a:r>
               <a:rPr lang="en-US" sz="2400" dirty="0"/>
-              <a:t>Brooke / </a:t>
-            </a:r>
-            <a:r>
-              <a:rPr lang="en-US" sz="2400" dirty="0" err="1"/>
-              <a:t>Adian</a:t>
-            </a:r>
-            <a:r>
-              <a:rPr lang="en-US" sz="2400" dirty="0"/>
-              <a:t> Slide</a:t>
+              <a:t>Brooke / Adrian Slide</a:t>
             </a:r>
             <a:br>
               <a:rPr lang="en-US" sz="4000" dirty="0"/>
@@ -7556,7 +9116,7 @@
 </p:sld>
 </file>
 
-<file path=ppt/slides/slide5.xml><?xml version="1.0" encoding="utf-8"?>
+<file path=ppt/slides/slide6.xml><?xml version="1.0" encoding="utf-8"?>
 <p:sld xmlns:a="http://schemas.openxmlformats.org/drawingml/2006/main" xmlns:r="http://schemas.openxmlformats.org/officeDocument/2006/relationships" xmlns:p="http://schemas.openxmlformats.org/presentationml/2006/main">
   <p:cSld>
     <p:spTree>
@@ -7863,7 +9423,7 @@
 </p:sld>
 </file>
 
-<file path=ppt/slides/slide6.xml><?xml version="1.0" encoding="utf-8"?>
+<file path=ppt/slides/slide7.xml><?xml version="1.0" encoding="utf-8"?>
 <p:sld xmlns:a="http://schemas.openxmlformats.org/drawingml/2006/main" xmlns:r="http://schemas.openxmlformats.org/officeDocument/2006/relationships" xmlns:p="http://schemas.openxmlformats.org/presentationml/2006/main">
   <p:cSld>
     <p:spTree>
@@ -8110,151 +9670,6 @@
     <p:extLst>
       <p:ext uri="{BB962C8B-B14F-4D97-AF65-F5344CB8AC3E}">
         <p14:creationId xmlns:p14="http://schemas.microsoft.com/office/powerpoint/2010/main" val="2464140853"/>
-      </p:ext>
-    </p:extLst>
-  </p:cSld>
-  <p:clrMapOvr>
-    <a:masterClrMapping/>
-  </p:clrMapOvr>
-</p:sld>
-</file>
-
-<file path=ppt/slides/slide7.xml><?xml version="1.0" encoding="utf-8"?>
-<p:sld xmlns:a="http://schemas.openxmlformats.org/drawingml/2006/main" xmlns:r="http://schemas.openxmlformats.org/officeDocument/2006/relationships" xmlns:p="http://schemas.openxmlformats.org/presentationml/2006/main">
-  <p:cSld>
-    <p:spTree>
-      <p:nvGrpSpPr>
-        <p:cNvPr id="1" name=""/>
-        <p:cNvGrpSpPr/>
-        <p:nvPr/>
-      </p:nvGrpSpPr>
-      <p:grpSpPr>
-        <a:xfrm>
-          <a:off x="0" y="0"/>
-          <a:ext cx="0" cy="0"/>
-          <a:chOff x="0" y="0"/>
-          <a:chExt cx="0" cy="0"/>
-        </a:xfrm>
-      </p:grpSpPr>
-      <p:sp>
-        <p:nvSpPr>
-          <p:cNvPr id="2" name="Title 1">
-            <a:extLst>
-              <a:ext uri="{FF2B5EF4-FFF2-40B4-BE49-F238E27FC236}">
-                <a16:creationId xmlns:a16="http://schemas.microsoft.com/office/drawing/2014/main" id="{3E235A5A-3EB3-4BD6-9271-FCBE19079F9A}"/>
-              </a:ext>
-            </a:extLst>
-          </p:cNvPr>
-          <p:cNvSpPr>
-            <a:spLocks noGrp="1"/>
-          </p:cNvSpPr>
-          <p:nvPr>
-            <p:ph type="title"/>
-          </p:nvPr>
-        </p:nvSpPr>
-        <p:spPr/>
-        <p:txBody>
-          <a:bodyPr>
-            <a:normAutofit/>
-          </a:bodyPr>
-          <a:lstStyle/>
-          <a:p>
-            <a:r>
-              <a:rPr lang="en-US" sz="2400" dirty="0"/>
-              <a:t>Brooke/Adrian Slide</a:t>
-            </a:r>
-            <a:br>
-              <a:rPr lang="en-US" dirty="0"/>
-            </a:br>
-            <a:r>
-              <a:rPr lang="en-US" dirty="0"/>
-              <a:t>Under-Reporting Implications</a:t>
-            </a:r>
-          </a:p>
-        </p:txBody>
-      </p:sp>
-      <p:sp>
-        <p:nvSpPr>
-          <p:cNvPr id="4" name="Content Placeholder 3">
-            <a:extLst>
-              <a:ext uri="{FF2B5EF4-FFF2-40B4-BE49-F238E27FC236}">
-                <a16:creationId xmlns:a16="http://schemas.microsoft.com/office/drawing/2014/main" id="{559B0A82-D77C-492B-8595-F7D54FCC7E2E}"/>
-              </a:ext>
-            </a:extLst>
-          </p:cNvPr>
-          <p:cNvSpPr>
-            <a:spLocks noGrp="1"/>
-          </p:cNvSpPr>
-          <p:nvPr>
-            <p:ph idx="1"/>
-          </p:nvPr>
-        </p:nvSpPr>
-        <p:spPr>
-          <a:xfrm>
-            <a:off x="575240" y="1833245"/>
-            <a:ext cx="11041520" cy="4351338"/>
-          </a:xfrm>
-        </p:spPr>
-        <p:txBody>
-          <a:bodyPr>
-            <a:normAutofit/>
-          </a:bodyPr>
-          <a:lstStyle/>
-          <a:p>
-            <a:pPr marL="0" indent="0">
-              <a:buNone/>
-            </a:pPr>
-            <a:r>
-              <a:rPr lang="en-US" dirty="0"/>
-              <a:t>Based on the data, we can infer:</a:t>
-            </a:r>
-          </a:p>
-          <a:p>
-            <a:pPr marL="914400" lvl="1" indent="-457200">
-              <a:buFont typeface="+mj-lt"/>
-              <a:buAutoNum type="arabicPeriod"/>
-            </a:pPr>
-            <a:r>
-              <a:rPr lang="en-US" dirty="0"/>
-              <a:t>Strongly Dem vs. Strongly Rep differences don’t come across as so dissimilar as to warrant a charge of rampant systematic underreporting owing to political partisanship.</a:t>
-            </a:r>
-          </a:p>
-          <a:p>
-            <a:pPr marL="914400" lvl="1" indent="-457200">
-              <a:buFont typeface="+mj-lt"/>
-              <a:buAutoNum type="arabicPeriod"/>
-            </a:pPr>
-            <a:r>
-              <a:rPr lang="en-US" dirty="0"/>
-              <a:t>Moreover, Divided States coming in higher than Strongly Rep indicate no correlation at all</a:t>
-            </a:r>
-          </a:p>
-          <a:p>
-            <a:pPr marL="457200" lvl="1" indent="0">
-              <a:buNone/>
-            </a:pPr>
-            <a:endParaRPr lang="en-US" dirty="0"/>
-          </a:p>
-          <a:p>
-            <a:pPr marL="0" indent="0">
-              <a:buNone/>
-            </a:pPr>
-            <a:r>
-              <a:rPr lang="en-US" dirty="0">
-                <a:solidFill>
-                  <a:srgbClr val="FFC000"/>
-                </a:solidFill>
-              </a:rPr>
-              <a:t>These findings are NOT in line with our speculation</a:t>
-            </a:r>
-            <a:endParaRPr lang="en-US" sz="1900" dirty="0"/>
-          </a:p>
-        </p:txBody>
-      </p:sp>
-    </p:spTree>
-    <p:extLst>
-      <p:ext uri="{BB962C8B-B14F-4D97-AF65-F5344CB8AC3E}">
-        <p14:creationId xmlns:p14="http://schemas.microsoft.com/office/powerpoint/2010/main" val="1379921840"/>
       </p:ext>
     </p:extLst>
   </p:cSld>
@@ -8312,10 +9727,9 @@
               <a:rPr lang="en-US" dirty="0"/>
             </a:br>
             <a:r>
-              <a:rPr lang="en-US" sz="4900" dirty="0"/>
-              <a:t>Additional Considerations Covid-19 Deaths</a:t>
-            </a:r>
-            <a:endParaRPr lang="en-US" dirty="0"/>
+              <a:rPr lang="en-US" sz="3800" dirty="0"/>
+              <a:t>Under-Reporting Not Correlated to State Party Alignment</a:t>
+            </a:r>
           </a:p>
         </p:txBody>
       </p:sp>
@@ -8343,45 +9757,64 @@
         </p:spPr>
         <p:txBody>
           <a:bodyPr>
-            <a:normAutofit fontScale="70000" lnSpcReduction="20000"/>
+            <a:normAutofit/>
           </a:bodyPr>
           <a:lstStyle/>
           <a:p>
-            <a:r>
-              <a:rPr lang="en-US" dirty="0"/>
-              <a:t>It’s important to recognize that some states with strong partisan control of the government may nonetheless have large constituencies aligned with the party out of power.  So, the magnitude of partisan splits may in reality be not that great.  </a:t>
-            </a:r>
-          </a:p>
-          <a:p>
-            <a:r>
-              <a:rPr lang="en-US" dirty="0"/>
-              <a:t>Further, the health systems that collect such data are really not all that partisan.  The primary way to skew the data to under-report would be to skew the methodology of how you capture the data in the first place.  And it is worth noting these systems were in place prior to the current pandemic.</a:t>
-            </a:r>
-          </a:p>
-          <a:p>
-            <a:r>
-              <a:rPr lang="en-US" dirty="0"/>
-              <a:t>Also notable, during periods of intensive pandemic spreading in “blue states” early on, health systems weren’t as careful in reporting on patients who were already dead than with paying attention to those still living.</a:t>
-            </a:r>
-          </a:p>
-          <a:p>
-            <a:r>
-              <a:rPr lang="en-US" dirty="0"/>
-              <a:t>Not least, Excess Deaths might necessarily capture say cancer as primary cause due to the deceased failing to go in for diagnosis or treatment because they were worried about Covid-19.  Or captures deaths due to a disease other than Covid-19 but where the deceased’s health was fatally weakened in the wake of a Covid-19 infection.  </a:t>
-            </a:r>
-          </a:p>
-          <a:p>
-            <a:r>
-              <a:rPr lang="en-US" dirty="0"/>
-              <a:t>Such issues can hardly be said to reflect willful misrepresentation on anybody’s part.  So, we infer that the count may more likely represent issues with reporting systems that provide only one entry for cause of death. </a:t>
-            </a:r>
+            <a:pPr marL="0" indent="0">
+              <a:buNone/>
+            </a:pPr>
+            <a:r>
+              <a:rPr lang="en-US" dirty="0"/>
+              <a:t>Based on the data, we can infer:</a:t>
+            </a:r>
+          </a:p>
+          <a:p>
+            <a:pPr marL="914400" lvl="1" indent="-457200">
+              <a:buFont typeface="+mj-lt"/>
+              <a:buAutoNum type="arabicPeriod"/>
+            </a:pPr>
+            <a:r>
+              <a:rPr lang="en-US" dirty="0"/>
+              <a:t>Strongly Dem vs. Strongly Rep differences don’t come across as so dissimilar as to warrant a charge of rampant systematic underreporting owing to political partisanship.</a:t>
+            </a:r>
+          </a:p>
+          <a:p>
+            <a:pPr marL="914400" lvl="1" indent="-457200">
+              <a:buFont typeface="+mj-lt"/>
+              <a:buAutoNum type="arabicPeriod"/>
+            </a:pPr>
+            <a:r>
+              <a:rPr lang="en-US" dirty="0"/>
+              <a:t>Moreover, Divided States coming in higher than Strongly Rep indicate no correlation at all</a:t>
+            </a:r>
+          </a:p>
+          <a:p>
+            <a:pPr marL="457200" lvl="1" indent="0">
+              <a:buNone/>
+            </a:pPr>
+            <a:endParaRPr lang="en-US" dirty="0"/>
+          </a:p>
+          <a:p>
+            <a:pPr marL="0" indent="0">
+              <a:buNone/>
+            </a:pPr>
+            <a:r>
+              <a:rPr lang="en-US" dirty="0">
+                <a:solidFill>
+                  <a:srgbClr val="FFC000"/>
+                </a:solidFill>
+              </a:rPr>
+              <a:t>These findings are NOT in line with our speculation</a:t>
+            </a:r>
+            <a:endParaRPr lang="en-US" sz="1900" dirty="0"/>
           </a:p>
         </p:txBody>
       </p:sp>
     </p:spTree>
     <p:extLst>
       <p:ext uri="{BB962C8B-B14F-4D97-AF65-F5344CB8AC3E}">
-        <p14:creationId xmlns:p14="http://schemas.microsoft.com/office/powerpoint/2010/main" val="4233463091"/>
+        <p14:creationId xmlns:p14="http://schemas.microsoft.com/office/powerpoint/2010/main" val="1379921840"/>
       </p:ext>
     </p:extLst>
   </p:cSld>
@@ -8413,7 +9846,7 @@
           <p:cNvPr id="2" name="Title 1">
             <a:extLst>
               <a:ext uri="{FF2B5EF4-FFF2-40B4-BE49-F238E27FC236}">
-                <a16:creationId xmlns:a16="http://schemas.microsoft.com/office/drawing/2014/main" id="{E02AABAF-448B-4D6A-98F0-31C63D31B459}"/>
+                <a16:creationId xmlns:a16="http://schemas.microsoft.com/office/drawing/2014/main" id="{3E235A5A-3EB3-4BD6-9271-FCBE19079F9A}"/>
               </a:ext>
             </a:extLst>
           </p:cNvPr>
@@ -8427,23 +9860,31 @@
         <p:spPr/>
         <p:txBody>
           <a:bodyPr>
-            <a:noAutofit/>
+            <a:normAutofit fontScale="90000"/>
           </a:bodyPr>
           <a:lstStyle/>
           <a:p>
             <a:r>
-              <a:rPr lang="en-US" sz="4000" dirty="0"/>
-              <a:t>Does a state’s partisan control impact short term unemployment during Covid-19?</a:t>
-            </a:r>
-          </a:p>
-        </p:txBody>
-      </p:sp>
-      <p:sp>
-        <p:nvSpPr>
-          <p:cNvPr id="3" name="Content Placeholder 2">
+              <a:rPr lang="en-US" sz="2400" dirty="0"/>
+              <a:t>Brooke/Adrian Slide</a:t>
+            </a:r>
+            <a:br>
+              <a:rPr lang="en-US" dirty="0"/>
+            </a:br>
+            <a:r>
+              <a:rPr lang="en-US" sz="4900" dirty="0"/>
+              <a:t>Additional Considerations Covid-19 Deaths</a:t>
+            </a:r>
+            <a:endParaRPr lang="en-US" dirty="0"/>
+          </a:p>
+        </p:txBody>
+      </p:sp>
+      <p:sp>
+        <p:nvSpPr>
+          <p:cNvPr id="4" name="Content Placeholder 3">
             <a:extLst>
               <a:ext uri="{FF2B5EF4-FFF2-40B4-BE49-F238E27FC236}">
-                <a16:creationId xmlns:a16="http://schemas.microsoft.com/office/drawing/2014/main" id="{437BBAFF-9B54-4D7F-B78F-9F740D21542D}"/>
+                <a16:creationId xmlns:a16="http://schemas.microsoft.com/office/drawing/2014/main" id="{559B0A82-D77C-492B-8595-F7D54FCC7E2E}"/>
               </a:ext>
             </a:extLst>
           </p:cNvPr>
@@ -8456,204 +9897,57 @@
         </p:nvSpPr>
         <p:spPr>
           <a:xfrm>
-            <a:off x="838200" y="1825625"/>
-            <a:ext cx="5829300" cy="4351338"/>
+            <a:off x="575240" y="1833245"/>
+            <a:ext cx="11041520" cy="4351338"/>
           </a:xfrm>
         </p:spPr>
         <p:txBody>
           <a:bodyPr>
-            <a:normAutofit fontScale="47500" lnSpcReduction="20000"/>
+            <a:noAutofit/>
           </a:bodyPr>
           <a:lstStyle/>
           <a:p>
             <a:r>
-              <a:rPr lang="en-US" sz="3400" dirty="0"/>
-              <a:t>3 variables:</a:t>
-            </a:r>
-          </a:p>
-          <a:p>
-            <a:pPr marL="914400" lvl="1" indent="-457200">
-              <a:buFont typeface="+mj-lt"/>
-              <a:buAutoNum type="arabicPeriod"/>
-            </a:pPr>
-            <a:r>
-              <a:rPr lang="en-US" sz="2900" dirty="0"/>
-              <a:t>Partisan control at state level</a:t>
-            </a:r>
-          </a:p>
-          <a:p>
-            <a:pPr marL="914400" lvl="1" indent="-457200">
-              <a:buFont typeface="+mj-lt"/>
-              <a:buAutoNum type="arabicPeriod"/>
-            </a:pPr>
-            <a:r>
-              <a:rPr lang="en-US" sz="2900" dirty="0"/>
-              <a:t>Number of Covid-19 cases</a:t>
-            </a:r>
-          </a:p>
-          <a:p>
-            <a:pPr lvl="2"/>
-            <a:r>
-              <a:rPr lang="en-US" sz="2500" dirty="0"/>
-              <a:t>New cases per 100,000 (avg per state)</a:t>
-            </a:r>
-          </a:p>
-          <a:p>
-            <a:pPr marL="914400" lvl="1" indent="-457200">
-              <a:buFont typeface="+mj-lt"/>
-              <a:buAutoNum type="arabicPeriod"/>
-            </a:pPr>
-            <a:r>
-              <a:rPr lang="en-US" sz="2900" dirty="0"/>
-              <a:t>Unemployment rate </a:t>
-            </a:r>
-          </a:p>
-          <a:p>
-            <a:pPr lvl="2"/>
-            <a:r>
-              <a:rPr lang="en-US" sz="2500" dirty="0">
-                <a:solidFill>
-                  <a:srgbClr val="FFC000"/>
-                </a:solidFill>
-              </a:rPr>
-              <a:t>Insured Unemployment Rate (avg rate per state)</a:t>
-            </a:r>
-          </a:p>
-          <a:p>
-            <a:pPr lvl="3"/>
-            <a:r>
-              <a:rPr lang="en-US" sz="2500" dirty="0">
-                <a:solidFill>
-                  <a:srgbClr val="FFC000"/>
-                </a:solidFill>
-              </a:rPr>
-              <a:t>“The number of people currently receiving unemployment insurance (UI) as a percentage of the labor force.” - stlouisfed.org</a:t>
-            </a:r>
-            <a:endParaRPr lang="en-US" dirty="0">
-              <a:solidFill>
-                <a:srgbClr val="FFC000"/>
-              </a:solidFill>
-            </a:endParaRPr>
-          </a:p>
-          <a:p>
-            <a:pPr marL="914400" lvl="2" indent="0">
-              <a:buNone/>
-            </a:pPr>
-            <a:endParaRPr lang="en-US" dirty="0"/>
-          </a:p>
-          <a:p>
-            <a:pPr marL="0" indent="0">
-              <a:buNone/>
-            </a:pPr>
-            <a:r>
-              <a:rPr lang="en-US" sz="4000" dirty="0"/>
-              <a:t>Is the partisanship of a state correlated to the state’s unemployment rate?</a:t>
-            </a:r>
-          </a:p>
-          <a:p>
-            <a:endParaRPr lang="en-US" sz="4000" dirty="0"/>
-          </a:p>
-          <a:p>
-            <a:pPr marL="0" indent="0">
-              <a:buNone/>
-            </a:pPr>
-            <a:r>
-              <a:rPr lang="en-US" sz="4000" dirty="0"/>
-              <a:t>Can we correlate the number of covid-19 cases to the unemployment rate?</a:t>
-            </a:r>
-          </a:p>
-          <a:p>
-            <a:endParaRPr lang="en-US" dirty="0"/>
-          </a:p>
-          <a:p>
-            <a:r>
-              <a:rPr lang="en-US" dirty="0"/>
-              <a:t>Sources: </a:t>
-            </a:r>
-          </a:p>
-          <a:p>
-            <a:pPr lvl="1">
-              <a:buFont typeface="Courier New" panose="02070309020205020404" pitchFamily="49" charset="0"/>
-              <a:buChar char="o"/>
-            </a:pPr>
-            <a:r>
-              <a:rPr lang="en-US" dirty="0"/>
-              <a:t>Unemployment claims by state.csv - </a:t>
-            </a:r>
-            <a:r>
-              <a:rPr lang="en-US" dirty="0">
-                <a:hlinkClick r:id="rId2"/>
-              </a:rPr>
-              <a:t>https://oui.doleta.gov/unemploy/claims.asp</a:t>
-            </a:r>
-            <a:endParaRPr lang="en-US" dirty="0"/>
-          </a:p>
-          <a:p>
-            <a:pPr lvl="1">
-              <a:buFont typeface="Courier New" panose="02070309020205020404" pitchFamily="49" charset="0"/>
-              <a:buChar char="o"/>
-            </a:pPr>
-            <a:r>
-              <a:rPr lang="en-US" dirty="0" err="1"/>
-              <a:t>Covid</a:t>
-            </a:r>
-            <a:r>
-              <a:rPr lang="en-US" dirty="0"/>
-              <a:t> cases by state.csv - </a:t>
-            </a:r>
-            <a:r>
-              <a:rPr lang="en-US" dirty="0">
-                <a:hlinkClick r:id="rId3"/>
-              </a:rPr>
-              <a:t>https://catalog.data.gov/dataset/united-states-covid-19-cases-and-deaths-by-state-over-time</a:t>
-            </a:r>
-            <a:r>
-              <a:rPr lang="en-US" dirty="0"/>
-              <a:t> </a:t>
-            </a:r>
-          </a:p>
-        </p:txBody>
-      </p:sp>
-      <p:pic>
-        <p:nvPicPr>
-          <p:cNvPr id="6" name="Picture 5">
-            <a:extLst>
-              <a:ext uri="{FF2B5EF4-FFF2-40B4-BE49-F238E27FC236}">
-                <a16:creationId xmlns:a16="http://schemas.microsoft.com/office/drawing/2014/main" id="{226C4FF3-B0BA-4AC7-A700-683E3977133C}"/>
-              </a:ext>
-            </a:extLst>
-          </p:cNvPr>
-          <p:cNvPicPr>
-            <a:picLocks noChangeAspect="1"/>
-          </p:cNvPicPr>
-          <p:nvPr/>
-        </p:nvPicPr>
-        <p:blipFill>
-          <a:blip r:embed="rId4">
-            <a:extLst>
-              <a:ext uri="{28A0092B-C50C-407E-A947-70E740481C1C}">
-                <a14:useLocalDpi xmlns:a14="http://schemas.microsoft.com/office/drawing/2010/main" val="0"/>
-              </a:ext>
-            </a:extLst>
-          </a:blip>
-          <a:stretch>
-            <a:fillRect/>
-          </a:stretch>
-        </p:blipFill>
-        <p:spPr>
-          <a:xfrm>
-            <a:off x="6812280" y="2105406"/>
-            <a:ext cx="4864696" cy="3312414"/>
-          </a:xfrm>
-          <a:prstGeom prst="rect">
-            <a:avLst/>
-          </a:prstGeom>
-        </p:spPr>
-      </p:pic>
+              <a:rPr lang="en-US" sz="1800" dirty="0"/>
+              <a:t>It’s important to recognize that some states with strong partisan control of the government may nonetheless have large constituencies aligned with the party out of power.  So, the magnitude of partisan splits may in reality be not that great.  </a:t>
+            </a:r>
+          </a:p>
+          <a:p>
+            <a:r>
+              <a:rPr lang="en-US" sz="1800" dirty="0"/>
+              <a:t>Further, the health systems that collect such data are really not all that partisan.  The primary way to skew the data to under-report would be to skew the methodology of how you capture the data in the first place.  And it is worth noting these systems were in place prior to the current pandemic.</a:t>
+            </a:r>
+          </a:p>
+          <a:p>
+            <a:r>
+              <a:rPr lang="en-US" sz="1800" dirty="0"/>
+              <a:t>Also notable, during periods of intensive pandemic spreading in “blue states” early on, health systems weren’t as careful in reporting on patients who were already dead than with paying attention to those still living.</a:t>
+            </a:r>
+          </a:p>
+          <a:p>
+            <a:r>
+              <a:rPr lang="en-US" sz="1800" dirty="0"/>
+              <a:t>Not least, Excess Deaths might necessarily capture say cancer as primary cause due to the deceased failing to go in for diagnosis or treatment because they were worried about Covid-19.  Or captures deaths due to a disease other than Covid-19 but where the deceased’s health was fatally weakened in the wake of a Covid-19 infection.  </a:t>
+            </a:r>
+          </a:p>
+          <a:p>
+            <a:r>
+              <a:rPr lang="en-US" sz="1800" dirty="0"/>
+              <a:t>Such issues can hardly be said to reflect willful misrepresentation on anybody’s part.  So, we infer that the count may more likely represent issues with reporting systems that provide only one entry for cause of death. </a:t>
+            </a:r>
+          </a:p>
+          <a:p>
+            <a:r>
+              <a:rPr lang="en-US" sz="1800" dirty="0"/>
+              <a:t>It is doubtful that our findings will change over a longer period given that in under 70 days, there will be a new government in the White House with stated goals of arresting the pandemic and cooling political polarization.</a:t>
+            </a:r>
+          </a:p>
+        </p:txBody>
+      </p:sp>
     </p:spTree>
     <p:extLst>
       <p:ext uri="{BB962C8B-B14F-4D97-AF65-F5344CB8AC3E}">
-        <p14:creationId xmlns:p14="http://schemas.microsoft.com/office/powerpoint/2010/main" val="2853199800"/>
+        <p14:creationId xmlns:p14="http://schemas.microsoft.com/office/powerpoint/2010/main" val="4233463091"/>
       </p:ext>
     </p:extLst>
   </p:cSld>

</xml_diff>